<commit_message>
add fig to sec4
</commit_message>
<xml_diff>
--- a/figures/figures.pptx
+++ b/figures/figures.pptx
@@ -6,15 +6,16 @@
   </p:sldMasterIdLst>
   <p:sldIdLst>
     <p:sldId id="265" r:id="rId2"/>
-    <p:sldId id="262" r:id="rId3"/>
-    <p:sldId id="264" r:id="rId4"/>
-    <p:sldId id="263" r:id="rId5"/>
-    <p:sldId id="256" r:id="rId6"/>
-    <p:sldId id="259" r:id="rId7"/>
-    <p:sldId id="261" r:id="rId8"/>
-    <p:sldId id="260" r:id="rId9"/>
-    <p:sldId id="257" r:id="rId10"/>
-    <p:sldId id="258" r:id="rId11"/>
+    <p:sldId id="266" r:id="rId3"/>
+    <p:sldId id="262" r:id="rId4"/>
+    <p:sldId id="264" r:id="rId5"/>
+    <p:sldId id="263" r:id="rId6"/>
+    <p:sldId id="256" r:id="rId7"/>
+    <p:sldId id="259" r:id="rId8"/>
+    <p:sldId id="261" r:id="rId9"/>
+    <p:sldId id="260" r:id="rId10"/>
+    <p:sldId id="257" r:id="rId11"/>
+    <p:sldId id="258" r:id="rId12"/>
   </p:sldIdLst>
   <p:sldSz cx="9144000" cy="6858000" type="screen4x3"/>
   <p:notesSz cx="6858000" cy="9144000"/>
@@ -3153,6 +3154,1606 @@
       </p:grpSpPr>
       <p:sp>
         <p:nvSpPr>
+          <p:cNvPr id="9" name="Rectangle 8"/>
+          <p:cNvSpPr/>
+          <p:nvPr/>
+        </p:nvSpPr>
+        <p:spPr>
+          <a:xfrm>
+            <a:off x="610109" y="1232885"/>
+            <a:ext cx="1342578" cy="640080"/>
+          </a:xfrm>
+          <a:prstGeom prst="rect">
+            <a:avLst/>
+          </a:prstGeom>
+          <a:noFill/>
+          <a:ln w="19050">
+            <a:solidFill>
+              <a:schemeClr val="tx1">
+                <a:lumMod val="75000"/>
+                <a:lumOff val="25000"/>
+              </a:schemeClr>
+            </a:solidFill>
+          </a:ln>
+        </p:spPr>
+        <p:style>
+          <a:lnRef idx="2">
+            <a:schemeClr val="accent1">
+              <a:shade val="50000"/>
+            </a:schemeClr>
+          </a:lnRef>
+          <a:fillRef idx="1">
+            <a:schemeClr val="accent1"/>
+          </a:fillRef>
+          <a:effectRef idx="0">
+            <a:schemeClr val="accent1"/>
+          </a:effectRef>
+          <a:fontRef idx="minor">
+            <a:schemeClr val="lt1"/>
+          </a:fontRef>
+        </p:style>
+        <p:txBody>
+          <a:bodyPr rtlCol="0" anchor="ctr"/>
+          <a:lstStyle/>
+          <a:p>
+            <a:pPr algn="ctr"/>
+            <a:r>
+              <a:rPr lang="en-US" dirty="0">
+                <a:solidFill>
+                  <a:schemeClr val="tx1"/>
+                </a:solidFill>
+              </a:rPr>
+              <a:t>TCP/IP Apps</a:t>
+            </a:r>
+          </a:p>
+          <a:p>
+            <a:pPr algn="ctr"/>
+            <a:r>
+              <a:rPr lang="en-US" dirty="0">
+                <a:solidFill>
+                  <a:schemeClr val="tx1"/>
+                </a:solidFill>
+              </a:rPr>
+              <a:t>Container </a:t>
+            </a:r>
+            <a:r>
+              <a:rPr lang="en-US" i="1" dirty="0">
+                <a:solidFill>
+                  <a:schemeClr val="tx1"/>
+                </a:solidFill>
+              </a:rPr>
+              <a:t>1</a:t>
+            </a:r>
+          </a:p>
+        </p:txBody>
+      </p:sp>
+      <p:sp>
+        <p:nvSpPr>
+          <p:cNvPr id="14" name="Rectangle 13"/>
+          <p:cNvSpPr/>
+          <p:nvPr/>
+        </p:nvSpPr>
+        <p:spPr>
+          <a:xfrm>
+            <a:off x="2108414" y="1241585"/>
+            <a:ext cx="1342578" cy="640080"/>
+          </a:xfrm>
+          <a:prstGeom prst="rect">
+            <a:avLst/>
+          </a:prstGeom>
+          <a:noFill/>
+          <a:ln w="19050">
+            <a:solidFill>
+              <a:schemeClr val="tx1">
+                <a:lumMod val="75000"/>
+                <a:lumOff val="25000"/>
+              </a:schemeClr>
+            </a:solidFill>
+          </a:ln>
+        </p:spPr>
+        <p:style>
+          <a:lnRef idx="2">
+            <a:schemeClr val="accent1">
+              <a:shade val="50000"/>
+            </a:schemeClr>
+          </a:lnRef>
+          <a:fillRef idx="1">
+            <a:schemeClr val="accent1"/>
+          </a:fillRef>
+          <a:effectRef idx="0">
+            <a:schemeClr val="accent1"/>
+          </a:effectRef>
+          <a:fontRef idx="minor">
+            <a:schemeClr val="lt1"/>
+          </a:fontRef>
+        </p:style>
+        <p:txBody>
+          <a:bodyPr rtlCol="0" anchor="ctr"/>
+          <a:lstStyle/>
+          <a:p>
+            <a:pPr algn="ctr"/>
+            <a:r>
+              <a:rPr lang="en-US" dirty="0">
+                <a:solidFill>
+                  <a:schemeClr val="tx1"/>
+                </a:solidFill>
+              </a:rPr>
+              <a:t>RDMA Apps</a:t>
+            </a:r>
+          </a:p>
+          <a:p>
+            <a:pPr algn="ctr"/>
+            <a:r>
+              <a:rPr lang="en-US" dirty="0">
+                <a:solidFill>
+                  <a:schemeClr val="tx1"/>
+                </a:solidFill>
+              </a:rPr>
+              <a:t>Container </a:t>
+            </a:r>
+            <a:r>
+              <a:rPr lang="en-US" i="1" dirty="0">
+                <a:solidFill>
+                  <a:schemeClr val="tx1"/>
+                </a:solidFill>
+              </a:rPr>
+              <a:t>2</a:t>
+            </a:r>
+          </a:p>
+        </p:txBody>
+      </p:sp>
+      <p:sp>
+        <p:nvSpPr>
+          <p:cNvPr id="55" name="TextBox 54"/>
+          <p:cNvSpPr txBox="1"/>
+          <p:nvPr/>
+        </p:nvSpPr>
+        <p:spPr>
+          <a:xfrm>
+            <a:off x="3589869" y="2248634"/>
+            <a:ext cx="999068" cy="646331"/>
+          </a:xfrm>
+          <a:prstGeom prst="rect">
+            <a:avLst/>
+          </a:prstGeom>
+          <a:noFill/>
+        </p:spPr>
+        <p:txBody>
+          <a:bodyPr wrap="square" rtlCol="0">
+            <a:spAutoFit/>
+          </a:bodyPr>
+          <a:lstStyle/>
+          <a:p>
+            <a:pPr algn="ctr"/>
+            <a:r>
+              <a:rPr lang="en-US" dirty="0"/>
+              <a:t>Location Queries</a:t>
+            </a:r>
+          </a:p>
+        </p:txBody>
+      </p:sp>
+      <p:sp>
+        <p:nvSpPr>
+          <p:cNvPr id="62" name="Rectangle 61"/>
+          <p:cNvSpPr/>
+          <p:nvPr/>
+        </p:nvSpPr>
+        <p:spPr>
+          <a:xfrm>
+            <a:off x="5892799" y="1234813"/>
+            <a:ext cx="2099733" cy="640080"/>
+          </a:xfrm>
+          <a:prstGeom prst="rect">
+            <a:avLst/>
+          </a:prstGeom>
+          <a:noFill/>
+          <a:ln w="19050">
+            <a:solidFill>
+              <a:schemeClr val="tx1">
+                <a:lumMod val="75000"/>
+                <a:lumOff val="25000"/>
+              </a:schemeClr>
+            </a:solidFill>
+          </a:ln>
+        </p:spPr>
+        <p:style>
+          <a:lnRef idx="2">
+            <a:schemeClr val="accent1">
+              <a:shade val="50000"/>
+            </a:schemeClr>
+          </a:lnRef>
+          <a:fillRef idx="1">
+            <a:schemeClr val="accent1"/>
+          </a:fillRef>
+          <a:effectRef idx="0">
+            <a:schemeClr val="accent1"/>
+          </a:effectRef>
+          <a:fontRef idx="minor">
+            <a:schemeClr val="lt1"/>
+          </a:fontRef>
+        </p:style>
+        <p:txBody>
+          <a:bodyPr rtlCol="0" anchor="ctr"/>
+          <a:lstStyle/>
+          <a:p>
+            <a:pPr algn="ctr"/>
+            <a:r>
+              <a:rPr lang="en-US" dirty="0">
+                <a:solidFill>
+                  <a:schemeClr val="tx1"/>
+                </a:solidFill>
+              </a:rPr>
+              <a:t>Container </a:t>
+            </a:r>
+            <a:r>
+              <a:rPr lang="en-US" i="1" dirty="0">
+                <a:solidFill>
+                  <a:schemeClr val="tx1"/>
+                </a:solidFill>
+              </a:rPr>
+              <a:t>3</a:t>
+            </a:r>
+          </a:p>
+        </p:txBody>
+      </p:sp>
+      <p:sp>
+        <p:nvSpPr>
+          <p:cNvPr id="53" name="Rectangle 5"/>
+          <p:cNvSpPr/>
+          <p:nvPr/>
+        </p:nvSpPr>
+        <p:spPr>
+          <a:xfrm>
+            <a:off x="617761" y="2576597"/>
+            <a:ext cx="2859916" cy="437744"/>
+          </a:xfrm>
+          <a:prstGeom prst="rect">
+            <a:avLst/>
+          </a:prstGeom>
+          <a:solidFill>
+            <a:schemeClr val="tx2">
+              <a:lumMod val="20000"/>
+              <a:lumOff val="80000"/>
+            </a:schemeClr>
+          </a:solidFill>
+          <a:ln w="19050">
+            <a:solidFill>
+              <a:schemeClr val="tx1">
+                <a:lumMod val="75000"/>
+                <a:lumOff val="25000"/>
+              </a:schemeClr>
+            </a:solidFill>
+          </a:ln>
+        </p:spPr>
+        <p:style>
+          <a:lnRef idx="2">
+            <a:schemeClr val="accent1">
+              <a:shade val="50000"/>
+            </a:schemeClr>
+          </a:lnRef>
+          <a:fillRef idx="1">
+            <a:schemeClr val="accent1"/>
+          </a:fillRef>
+          <a:effectRef idx="0">
+            <a:schemeClr val="accent1"/>
+          </a:effectRef>
+          <a:fontRef idx="minor">
+            <a:schemeClr val="lt1"/>
+          </a:fontRef>
+        </p:style>
+        <p:txBody>
+          <a:bodyPr rtlCol="0" anchor="ctr"/>
+          <a:lstStyle/>
+          <a:p>
+            <a:pPr algn="ctr"/>
+            <a:r>
+              <a:rPr lang="en-US" dirty="0">
+                <a:solidFill>
+                  <a:sysClr val="windowText" lastClr="000000"/>
+                </a:solidFill>
+              </a:rPr>
+              <a:t>Verbs API</a:t>
+            </a:r>
+          </a:p>
+        </p:txBody>
+      </p:sp>
+      <p:sp>
+        <p:nvSpPr>
+          <p:cNvPr id="66" name="Rectangle 5"/>
+          <p:cNvSpPr/>
+          <p:nvPr/>
+        </p:nvSpPr>
+        <p:spPr>
+          <a:xfrm>
+            <a:off x="607347" y="2007238"/>
+            <a:ext cx="1342578" cy="437744"/>
+          </a:xfrm>
+          <a:prstGeom prst="rect">
+            <a:avLst/>
+          </a:prstGeom>
+          <a:solidFill>
+            <a:schemeClr val="tx2">
+              <a:lumMod val="20000"/>
+              <a:lumOff val="80000"/>
+            </a:schemeClr>
+          </a:solidFill>
+          <a:ln w="19050">
+            <a:solidFill>
+              <a:schemeClr val="tx1">
+                <a:lumMod val="75000"/>
+                <a:lumOff val="25000"/>
+              </a:schemeClr>
+            </a:solidFill>
+          </a:ln>
+        </p:spPr>
+        <p:style>
+          <a:lnRef idx="2">
+            <a:schemeClr val="accent1">
+              <a:shade val="50000"/>
+            </a:schemeClr>
+          </a:lnRef>
+          <a:fillRef idx="1">
+            <a:schemeClr val="accent1"/>
+          </a:fillRef>
+          <a:effectRef idx="0">
+            <a:schemeClr val="accent1"/>
+          </a:effectRef>
+          <a:fontRef idx="minor">
+            <a:schemeClr val="lt1"/>
+          </a:fontRef>
+        </p:style>
+        <p:txBody>
+          <a:bodyPr rtlCol="0" anchor="ctr"/>
+          <a:lstStyle/>
+          <a:p>
+            <a:pPr algn="ctr"/>
+            <a:r>
+              <a:rPr lang="en-US" dirty="0">
+                <a:solidFill>
+                  <a:sysClr val="windowText" lastClr="000000"/>
+                </a:solidFill>
+              </a:rPr>
+              <a:t>IP to Verbs </a:t>
+            </a:r>
+          </a:p>
+        </p:txBody>
+      </p:sp>
+      <p:cxnSp>
+        <p:nvCxnSpPr>
+          <p:cNvPr id="67" name="Straight Connector 26"/>
+          <p:cNvCxnSpPr/>
+          <p:nvPr/>
+        </p:nvCxnSpPr>
+        <p:spPr>
+          <a:xfrm>
+            <a:off x="1289046" y="1878454"/>
+            <a:ext cx="0" cy="137160"/>
+          </a:xfrm>
+          <a:prstGeom prst="line">
+            <a:avLst/>
+          </a:prstGeom>
+          <a:ln w="19050">
+            <a:solidFill>
+              <a:schemeClr val="tx1"/>
+            </a:solidFill>
+            <a:headEnd type="none"/>
+            <a:tailEnd type="arrow"/>
+          </a:ln>
+        </p:spPr>
+        <p:style>
+          <a:lnRef idx="1">
+            <a:schemeClr val="accent1"/>
+          </a:lnRef>
+          <a:fillRef idx="0">
+            <a:schemeClr val="accent1"/>
+          </a:fillRef>
+          <a:effectRef idx="0">
+            <a:schemeClr val="accent1"/>
+          </a:effectRef>
+          <a:fontRef idx="minor">
+            <a:schemeClr val="tx1"/>
+          </a:fontRef>
+        </p:style>
+      </p:cxnSp>
+      <p:cxnSp>
+        <p:nvCxnSpPr>
+          <p:cNvPr id="68" name="Straight Connector 26"/>
+          <p:cNvCxnSpPr/>
+          <p:nvPr/>
+        </p:nvCxnSpPr>
+        <p:spPr>
+          <a:xfrm>
+            <a:off x="2765325" y="1869218"/>
+            <a:ext cx="0" cy="685800"/>
+          </a:xfrm>
+          <a:prstGeom prst="line">
+            <a:avLst/>
+          </a:prstGeom>
+          <a:ln w="19050">
+            <a:solidFill>
+              <a:schemeClr val="tx1"/>
+            </a:solidFill>
+            <a:headEnd type="none"/>
+            <a:tailEnd type="arrow"/>
+          </a:ln>
+        </p:spPr>
+        <p:style>
+          <a:lnRef idx="1">
+            <a:schemeClr val="accent1"/>
+          </a:lnRef>
+          <a:fillRef idx="0">
+            <a:schemeClr val="accent1"/>
+          </a:fillRef>
+          <a:effectRef idx="0">
+            <a:schemeClr val="accent1"/>
+          </a:effectRef>
+          <a:fontRef idx="minor">
+            <a:schemeClr val="tx1"/>
+          </a:fontRef>
+        </p:style>
+      </p:cxnSp>
+      <p:sp>
+        <p:nvSpPr>
+          <p:cNvPr id="69" name="Rectangle 5"/>
+          <p:cNvSpPr/>
+          <p:nvPr/>
+        </p:nvSpPr>
+        <p:spPr>
+          <a:xfrm>
+            <a:off x="623918" y="3442677"/>
+            <a:ext cx="2859916" cy="437744"/>
+          </a:xfrm>
+          <a:prstGeom prst="rect">
+            <a:avLst/>
+          </a:prstGeom>
+          <a:solidFill>
+            <a:schemeClr val="tx2">
+              <a:lumMod val="20000"/>
+              <a:lumOff val="80000"/>
+            </a:schemeClr>
+          </a:solidFill>
+          <a:ln w="19050">
+            <a:solidFill>
+              <a:schemeClr val="tx1">
+                <a:lumMod val="75000"/>
+                <a:lumOff val="25000"/>
+              </a:schemeClr>
+            </a:solidFill>
+          </a:ln>
+        </p:spPr>
+        <p:style>
+          <a:lnRef idx="2">
+            <a:schemeClr val="accent1">
+              <a:shade val="50000"/>
+            </a:schemeClr>
+          </a:lnRef>
+          <a:fillRef idx="1">
+            <a:schemeClr val="accent1"/>
+          </a:fillRef>
+          <a:effectRef idx="0">
+            <a:schemeClr val="accent1"/>
+          </a:effectRef>
+          <a:fontRef idx="minor">
+            <a:schemeClr val="lt1"/>
+          </a:fontRef>
+        </p:style>
+        <p:txBody>
+          <a:bodyPr rtlCol="0" anchor="ctr"/>
+          <a:lstStyle/>
+          <a:p>
+            <a:pPr algn="ctr"/>
+            <a:r>
+              <a:rPr lang="en-US" dirty="0">
+                <a:solidFill>
+                  <a:sysClr val="windowText" lastClr="000000"/>
+                </a:solidFill>
+              </a:rPr>
+              <a:t>Container Locator</a:t>
+            </a:r>
+          </a:p>
+        </p:txBody>
+      </p:sp>
+      <p:cxnSp>
+        <p:nvCxnSpPr>
+          <p:cNvPr id="71" name="Straight Connector 26"/>
+          <p:cNvCxnSpPr/>
+          <p:nvPr/>
+        </p:nvCxnSpPr>
+        <p:spPr>
+          <a:xfrm>
+            <a:off x="2078755" y="3045571"/>
+            <a:ext cx="0" cy="365760"/>
+          </a:xfrm>
+          <a:prstGeom prst="line">
+            <a:avLst/>
+          </a:prstGeom>
+          <a:ln w="19050">
+            <a:solidFill>
+              <a:schemeClr val="tx1"/>
+            </a:solidFill>
+            <a:headEnd type="none"/>
+            <a:tailEnd type="arrow"/>
+          </a:ln>
+        </p:spPr>
+        <p:style>
+          <a:lnRef idx="1">
+            <a:schemeClr val="accent1"/>
+          </a:lnRef>
+          <a:fillRef idx="0">
+            <a:schemeClr val="accent1"/>
+          </a:fillRef>
+          <a:effectRef idx="0">
+            <a:schemeClr val="accent1"/>
+          </a:effectRef>
+          <a:fontRef idx="minor">
+            <a:schemeClr val="tx1"/>
+          </a:fontRef>
+        </p:style>
+      </p:cxnSp>
+      <p:cxnSp>
+        <p:nvCxnSpPr>
+          <p:cNvPr id="73" name="Straight Connector 26"/>
+          <p:cNvCxnSpPr/>
+          <p:nvPr/>
+        </p:nvCxnSpPr>
+        <p:spPr>
+          <a:xfrm>
+            <a:off x="1286225" y="2440073"/>
+            <a:ext cx="0" cy="137160"/>
+          </a:xfrm>
+          <a:prstGeom prst="line">
+            <a:avLst/>
+          </a:prstGeom>
+          <a:ln w="19050">
+            <a:solidFill>
+              <a:schemeClr val="tx1"/>
+            </a:solidFill>
+            <a:headEnd type="none"/>
+            <a:tailEnd type="arrow"/>
+          </a:ln>
+        </p:spPr>
+        <p:style>
+          <a:lnRef idx="1">
+            <a:schemeClr val="accent1"/>
+          </a:lnRef>
+          <a:fillRef idx="0">
+            <a:schemeClr val="accent1"/>
+          </a:fillRef>
+          <a:effectRef idx="0">
+            <a:schemeClr val="accent1"/>
+          </a:effectRef>
+          <a:fontRef idx="minor">
+            <a:schemeClr val="tx1"/>
+          </a:fontRef>
+        </p:style>
+      </p:cxnSp>
+      <p:sp>
+        <p:nvSpPr>
+          <p:cNvPr id="74" name="Rectangle 5"/>
+          <p:cNvSpPr/>
+          <p:nvPr/>
+        </p:nvSpPr>
+        <p:spPr>
+          <a:xfrm>
+            <a:off x="621096" y="4308757"/>
+            <a:ext cx="2859916" cy="437744"/>
+          </a:xfrm>
+          <a:prstGeom prst="rect">
+            <a:avLst/>
+          </a:prstGeom>
+          <a:solidFill>
+            <a:schemeClr val="tx2">
+              <a:lumMod val="20000"/>
+              <a:lumOff val="80000"/>
+            </a:schemeClr>
+          </a:solidFill>
+          <a:ln w="19050">
+            <a:solidFill>
+              <a:schemeClr val="tx1">
+                <a:lumMod val="75000"/>
+                <a:lumOff val="25000"/>
+              </a:schemeClr>
+            </a:solidFill>
+          </a:ln>
+        </p:spPr>
+        <p:style>
+          <a:lnRef idx="2">
+            <a:schemeClr val="accent1">
+              <a:shade val="50000"/>
+            </a:schemeClr>
+          </a:lnRef>
+          <a:fillRef idx="1">
+            <a:schemeClr val="accent1"/>
+          </a:fillRef>
+          <a:effectRef idx="0">
+            <a:schemeClr val="accent1"/>
+          </a:effectRef>
+          <a:fontRef idx="minor">
+            <a:schemeClr val="lt1"/>
+          </a:fontRef>
+        </p:style>
+        <p:txBody>
+          <a:bodyPr rtlCol="0" anchor="ctr"/>
+          <a:lstStyle/>
+          <a:p>
+            <a:pPr algn="ctr"/>
+            <a:r>
+              <a:rPr lang="en-US" dirty="0">
+                <a:solidFill>
+                  <a:sysClr val="windowText" lastClr="000000"/>
+                </a:solidFill>
+              </a:rPr>
+              <a:t>Virtualized NIC</a:t>
+            </a:r>
+          </a:p>
+        </p:txBody>
+      </p:sp>
+      <p:sp>
+        <p:nvSpPr>
+          <p:cNvPr id="76" name="Rectangle 5"/>
+          <p:cNvSpPr/>
+          <p:nvPr/>
+        </p:nvSpPr>
+        <p:spPr>
+          <a:xfrm>
+            <a:off x="4032828" y="2891011"/>
+            <a:ext cx="1342578" cy="457200"/>
+          </a:xfrm>
+          <a:prstGeom prst="rect">
+            <a:avLst/>
+          </a:prstGeom>
+          <a:solidFill>
+            <a:srgbClr val="FFFFFF"/>
+          </a:solidFill>
+          <a:ln w="19050">
+            <a:solidFill>
+              <a:schemeClr val="tx1">
+                <a:lumMod val="75000"/>
+                <a:lumOff val="25000"/>
+              </a:schemeClr>
+            </a:solidFill>
+          </a:ln>
+        </p:spPr>
+        <p:style>
+          <a:lnRef idx="2">
+            <a:schemeClr val="accent1">
+              <a:shade val="50000"/>
+            </a:schemeClr>
+          </a:lnRef>
+          <a:fillRef idx="1">
+            <a:schemeClr val="accent1"/>
+          </a:fillRef>
+          <a:effectRef idx="0">
+            <a:schemeClr val="accent1"/>
+          </a:effectRef>
+          <a:fontRef idx="minor">
+            <a:schemeClr val="lt1"/>
+          </a:fontRef>
+        </p:style>
+        <p:txBody>
+          <a:bodyPr rtlCol="0" anchor="ctr"/>
+          <a:lstStyle/>
+          <a:p>
+            <a:pPr algn="ctr"/>
+            <a:r>
+              <a:rPr lang="en-US" dirty="0" err="1">
+                <a:solidFill>
+                  <a:sysClr val="windowText" lastClr="000000"/>
+                </a:solidFill>
+              </a:rPr>
+              <a:t>Mesos</a:t>
+            </a:r>
+            <a:endParaRPr lang="en-US" dirty="0">
+              <a:solidFill>
+                <a:sysClr val="windowText" lastClr="000000"/>
+              </a:solidFill>
+            </a:endParaRPr>
+          </a:p>
+        </p:txBody>
+      </p:sp>
+      <p:sp>
+        <p:nvSpPr>
+          <p:cNvPr id="77" name="Rectangle 5"/>
+          <p:cNvSpPr/>
+          <p:nvPr/>
+        </p:nvSpPr>
+        <p:spPr>
+          <a:xfrm>
+            <a:off x="4044117" y="3430056"/>
+            <a:ext cx="1342578" cy="457200"/>
+          </a:xfrm>
+          <a:prstGeom prst="rect">
+            <a:avLst/>
+          </a:prstGeom>
+          <a:solidFill>
+            <a:srgbClr val="FFFFFF"/>
+          </a:solidFill>
+          <a:ln w="19050">
+            <a:solidFill>
+              <a:schemeClr val="tx1">
+                <a:lumMod val="75000"/>
+                <a:lumOff val="25000"/>
+              </a:schemeClr>
+            </a:solidFill>
+          </a:ln>
+        </p:spPr>
+        <p:style>
+          <a:lnRef idx="2">
+            <a:schemeClr val="accent1">
+              <a:shade val="50000"/>
+            </a:schemeClr>
+          </a:lnRef>
+          <a:fillRef idx="1">
+            <a:schemeClr val="accent1"/>
+          </a:fillRef>
+          <a:effectRef idx="0">
+            <a:schemeClr val="accent1"/>
+          </a:effectRef>
+          <a:fontRef idx="minor">
+            <a:schemeClr val="lt1"/>
+          </a:fontRef>
+        </p:style>
+        <p:txBody>
+          <a:bodyPr rtlCol="0" anchor="ctr"/>
+          <a:lstStyle/>
+          <a:p>
+            <a:pPr algn="ctr">
+              <a:lnSpc>
+                <a:spcPct val="80000"/>
+              </a:lnSpc>
+            </a:pPr>
+            <a:r>
+              <a:rPr lang="en-US" dirty="0">
+                <a:solidFill>
+                  <a:sysClr val="windowText" lastClr="000000"/>
+                </a:solidFill>
+              </a:rPr>
+              <a:t>Fabric Controller</a:t>
+            </a:r>
+          </a:p>
+        </p:txBody>
+      </p:sp>
+      <p:sp>
+        <p:nvSpPr>
+          <p:cNvPr id="80" name="Rectangle 5"/>
+          <p:cNvSpPr/>
+          <p:nvPr/>
+        </p:nvSpPr>
+        <p:spPr>
+          <a:xfrm>
+            <a:off x="618274" y="5174838"/>
+            <a:ext cx="2859916" cy="437744"/>
+          </a:xfrm>
+          <a:prstGeom prst="rect">
+            <a:avLst/>
+          </a:prstGeom>
+          <a:solidFill>
+            <a:schemeClr val="tx2">
+              <a:lumMod val="20000"/>
+              <a:lumOff val="80000"/>
+            </a:schemeClr>
+          </a:solidFill>
+          <a:ln w="19050">
+            <a:solidFill>
+              <a:schemeClr val="tx1">
+                <a:lumMod val="75000"/>
+                <a:lumOff val="25000"/>
+              </a:schemeClr>
+            </a:solidFill>
+          </a:ln>
+        </p:spPr>
+        <p:style>
+          <a:lnRef idx="2">
+            <a:schemeClr val="accent1">
+              <a:shade val="50000"/>
+            </a:schemeClr>
+          </a:lnRef>
+          <a:fillRef idx="1">
+            <a:schemeClr val="accent1"/>
+          </a:fillRef>
+          <a:effectRef idx="0">
+            <a:schemeClr val="accent1"/>
+          </a:effectRef>
+          <a:fontRef idx="minor">
+            <a:schemeClr val="lt1"/>
+          </a:fontRef>
+        </p:style>
+        <p:txBody>
+          <a:bodyPr rtlCol="0" anchor="ctr"/>
+          <a:lstStyle/>
+          <a:p>
+            <a:pPr algn="ctr"/>
+            <a:r>
+              <a:rPr lang="en-US" dirty="0">
+                <a:solidFill>
+                  <a:sysClr val="windowText" lastClr="000000"/>
+                </a:solidFill>
+              </a:rPr>
+              <a:t>NIC</a:t>
+            </a:r>
+          </a:p>
+        </p:txBody>
+      </p:sp>
+      <p:sp>
+        <p:nvSpPr>
+          <p:cNvPr id="82" name="Rectangle 5"/>
+          <p:cNvSpPr/>
+          <p:nvPr/>
+        </p:nvSpPr>
+        <p:spPr>
+          <a:xfrm>
+            <a:off x="5900961" y="2576598"/>
+            <a:ext cx="2103120" cy="437744"/>
+          </a:xfrm>
+          <a:prstGeom prst="rect">
+            <a:avLst/>
+          </a:prstGeom>
+          <a:solidFill>
+            <a:schemeClr val="tx2">
+              <a:lumMod val="20000"/>
+              <a:lumOff val="80000"/>
+            </a:schemeClr>
+          </a:solidFill>
+          <a:ln w="19050">
+            <a:solidFill>
+              <a:schemeClr val="tx1">
+                <a:lumMod val="75000"/>
+                <a:lumOff val="25000"/>
+              </a:schemeClr>
+            </a:solidFill>
+          </a:ln>
+        </p:spPr>
+        <p:style>
+          <a:lnRef idx="2">
+            <a:schemeClr val="accent1">
+              <a:shade val="50000"/>
+            </a:schemeClr>
+          </a:lnRef>
+          <a:fillRef idx="1">
+            <a:schemeClr val="accent1"/>
+          </a:fillRef>
+          <a:effectRef idx="0">
+            <a:schemeClr val="accent1"/>
+          </a:effectRef>
+          <a:fontRef idx="minor">
+            <a:schemeClr val="lt1"/>
+          </a:fontRef>
+        </p:style>
+        <p:txBody>
+          <a:bodyPr rtlCol="0" anchor="ctr"/>
+          <a:lstStyle/>
+          <a:p>
+            <a:pPr algn="ctr"/>
+            <a:r>
+              <a:rPr lang="en-US" dirty="0">
+                <a:solidFill>
+                  <a:sysClr val="windowText" lastClr="000000"/>
+                </a:solidFill>
+              </a:rPr>
+              <a:t>Verbs API</a:t>
+            </a:r>
+          </a:p>
+        </p:txBody>
+      </p:sp>
+      <p:sp>
+        <p:nvSpPr>
+          <p:cNvPr id="83" name="Rectangle 5"/>
+          <p:cNvSpPr/>
+          <p:nvPr/>
+        </p:nvSpPr>
+        <p:spPr>
+          <a:xfrm>
+            <a:off x="5907118" y="3442678"/>
+            <a:ext cx="2103120" cy="437744"/>
+          </a:xfrm>
+          <a:prstGeom prst="rect">
+            <a:avLst/>
+          </a:prstGeom>
+          <a:solidFill>
+            <a:schemeClr val="tx2">
+              <a:lumMod val="20000"/>
+              <a:lumOff val="80000"/>
+            </a:schemeClr>
+          </a:solidFill>
+          <a:ln w="19050">
+            <a:solidFill>
+              <a:schemeClr val="tx1">
+                <a:lumMod val="75000"/>
+                <a:lumOff val="25000"/>
+              </a:schemeClr>
+            </a:solidFill>
+          </a:ln>
+        </p:spPr>
+        <p:style>
+          <a:lnRef idx="2">
+            <a:schemeClr val="accent1">
+              <a:shade val="50000"/>
+            </a:schemeClr>
+          </a:lnRef>
+          <a:fillRef idx="1">
+            <a:schemeClr val="accent1"/>
+          </a:fillRef>
+          <a:effectRef idx="0">
+            <a:schemeClr val="accent1"/>
+          </a:effectRef>
+          <a:fontRef idx="minor">
+            <a:schemeClr val="lt1"/>
+          </a:fontRef>
+        </p:style>
+        <p:txBody>
+          <a:bodyPr rtlCol="0" anchor="ctr"/>
+          <a:lstStyle/>
+          <a:p>
+            <a:pPr algn="ctr"/>
+            <a:r>
+              <a:rPr lang="en-US" dirty="0">
+                <a:solidFill>
+                  <a:sysClr val="windowText" lastClr="000000"/>
+                </a:solidFill>
+              </a:rPr>
+              <a:t>Container Locator</a:t>
+            </a:r>
+          </a:p>
+        </p:txBody>
+      </p:sp>
+      <p:sp>
+        <p:nvSpPr>
+          <p:cNvPr id="85" name="Rectangle 5"/>
+          <p:cNvSpPr/>
+          <p:nvPr/>
+        </p:nvSpPr>
+        <p:spPr>
+          <a:xfrm>
+            <a:off x="5904296" y="4308758"/>
+            <a:ext cx="2103120" cy="437744"/>
+          </a:xfrm>
+          <a:prstGeom prst="rect">
+            <a:avLst/>
+          </a:prstGeom>
+          <a:solidFill>
+            <a:schemeClr val="tx2">
+              <a:lumMod val="20000"/>
+              <a:lumOff val="80000"/>
+            </a:schemeClr>
+          </a:solidFill>
+          <a:ln w="19050">
+            <a:solidFill>
+              <a:schemeClr val="tx1">
+                <a:lumMod val="75000"/>
+                <a:lumOff val="25000"/>
+              </a:schemeClr>
+            </a:solidFill>
+          </a:ln>
+        </p:spPr>
+        <p:style>
+          <a:lnRef idx="2">
+            <a:schemeClr val="accent1">
+              <a:shade val="50000"/>
+            </a:schemeClr>
+          </a:lnRef>
+          <a:fillRef idx="1">
+            <a:schemeClr val="accent1"/>
+          </a:fillRef>
+          <a:effectRef idx="0">
+            <a:schemeClr val="accent1"/>
+          </a:effectRef>
+          <a:fontRef idx="minor">
+            <a:schemeClr val="lt1"/>
+          </a:fontRef>
+        </p:style>
+        <p:txBody>
+          <a:bodyPr rtlCol="0" anchor="ctr"/>
+          <a:lstStyle/>
+          <a:p>
+            <a:pPr algn="ctr"/>
+            <a:r>
+              <a:rPr lang="en-US" dirty="0">
+                <a:solidFill>
+                  <a:sysClr val="windowText" lastClr="000000"/>
+                </a:solidFill>
+              </a:rPr>
+              <a:t>Virtualized NIC</a:t>
+            </a:r>
+          </a:p>
+        </p:txBody>
+      </p:sp>
+      <p:sp>
+        <p:nvSpPr>
+          <p:cNvPr id="86" name="Rectangle 5"/>
+          <p:cNvSpPr/>
+          <p:nvPr/>
+        </p:nvSpPr>
+        <p:spPr>
+          <a:xfrm>
+            <a:off x="5901474" y="5174839"/>
+            <a:ext cx="2103120" cy="437744"/>
+          </a:xfrm>
+          <a:prstGeom prst="rect">
+            <a:avLst/>
+          </a:prstGeom>
+          <a:solidFill>
+            <a:schemeClr val="tx2">
+              <a:lumMod val="20000"/>
+              <a:lumOff val="80000"/>
+            </a:schemeClr>
+          </a:solidFill>
+          <a:ln w="19050">
+            <a:solidFill>
+              <a:schemeClr val="tx1">
+                <a:lumMod val="75000"/>
+                <a:lumOff val="25000"/>
+              </a:schemeClr>
+            </a:solidFill>
+          </a:ln>
+        </p:spPr>
+        <p:style>
+          <a:lnRef idx="2">
+            <a:schemeClr val="accent1">
+              <a:shade val="50000"/>
+            </a:schemeClr>
+          </a:lnRef>
+          <a:fillRef idx="1">
+            <a:schemeClr val="accent1"/>
+          </a:fillRef>
+          <a:effectRef idx="0">
+            <a:schemeClr val="accent1"/>
+          </a:effectRef>
+          <a:fontRef idx="minor">
+            <a:schemeClr val="lt1"/>
+          </a:fontRef>
+        </p:style>
+        <p:txBody>
+          <a:bodyPr rtlCol="0" anchor="ctr"/>
+          <a:lstStyle/>
+          <a:p>
+            <a:pPr algn="ctr"/>
+            <a:r>
+              <a:rPr lang="en-US" dirty="0">
+                <a:solidFill>
+                  <a:sysClr val="windowText" lastClr="000000"/>
+                </a:solidFill>
+              </a:rPr>
+              <a:t>NIC</a:t>
+            </a:r>
+          </a:p>
+        </p:txBody>
+      </p:sp>
+      <p:sp>
+        <p:nvSpPr>
+          <p:cNvPr id="87" name="TextBox 54"/>
+          <p:cNvSpPr txBox="1"/>
+          <p:nvPr/>
+        </p:nvSpPr>
+        <p:spPr>
+          <a:xfrm>
+            <a:off x="3843864" y="4111301"/>
+            <a:ext cx="2262629" cy="369332"/>
+          </a:xfrm>
+          <a:prstGeom prst="rect">
+            <a:avLst/>
+          </a:prstGeom>
+          <a:noFill/>
+        </p:spPr>
+        <p:txBody>
+          <a:bodyPr wrap="square" rtlCol="0">
+            <a:spAutoFit/>
+          </a:bodyPr>
+          <a:lstStyle/>
+          <a:p>
+            <a:r>
+              <a:rPr lang="en-US" dirty="0"/>
+              <a:t>Shared Memory</a:t>
+            </a:r>
+          </a:p>
+        </p:txBody>
+      </p:sp>
+      <p:cxnSp>
+        <p:nvCxnSpPr>
+          <p:cNvPr id="89" name="Straight Connector 26"/>
+          <p:cNvCxnSpPr>
+            <a:stCxn id="69" idx="3"/>
+            <a:endCxn id="77" idx="1"/>
+          </p:cNvCxnSpPr>
+          <p:nvPr/>
+        </p:nvCxnSpPr>
+        <p:spPr>
+          <a:xfrm flipV="1">
+            <a:off x="3483834" y="3658656"/>
+            <a:ext cx="560283" cy="2893"/>
+          </a:xfrm>
+          <a:prstGeom prst="line">
+            <a:avLst/>
+          </a:prstGeom>
+          <a:ln w="28575" cmpd="sng">
+            <a:solidFill>
+              <a:schemeClr val="tx1"/>
+            </a:solidFill>
+            <a:prstDash val="dash"/>
+            <a:headEnd type="none"/>
+            <a:tailEnd type="arrow"/>
+          </a:ln>
+        </p:spPr>
+        <p:style>
+          <a:lnRef idx="1">
+            <a:schemeClr val="accent1"/>
+          </a:lnRef>
+          <a:fillRef idx="0">
+            <a:schemeClr val="accent1"/>
+          </a:fillRef>
+          <a:effectRef idx="0">
+            <a:schemeClr val="accent1"/>
+          </a:effectRef>
+          <a:fontRef idx="minor">
+            <a:schemeClr val="tx1"/>
+          </a:fontRef>
+        </p:style>
+      </p:cxnSp>
+      <p:cxnSp>
+        <p:nvCxnSpPr>
+          <p:cNvPr id="90" name="Straight Connector 26"/>
+          <p:cNvCxnSpPr/>
+          <p:nvPr/>
+        </p:nvCxnSpPr>
+        <p:spPr>
+          <a:xfrm>
+            <a:off x="3501155" y="4518771"/>
+            <a:ext cx="2403141" cy="8859"/>
+          </a:xfrm>
+          <a:prstGeom prst="line">
+            <a:avLst/>
+          </a:prstGeom>
+          <a:ln w="19050">
+            <a:solidFill>
+              <a:schemeClr val="tx1"/>
+            </a:solidFill>
+            <a:headEnd type="none"/>
+            <a:tailEnd type="arrow"/>
+          </a:ln>
+        </p:spPr>
+        <p:style>
+          <a:lnRef idx="1">
+            <a:schemeClr val="accent1"/>
+          </a:lnRef>
+          <a:fillRef idx="0">
+            <a:schemeClr val="accent1"/>
+          </a:fillRef>
+          <a:effectRef idx="0">
+            <a:schemeClr val="accent1"/>
+          </a:effectRef>
+          <a:fontRef idx="minor">
+            <a:schemeClr val="tx1"/>
+          </a:fontRef>
+        </p:style>
+      </p:cxnSp>
+      <p:cxnSp>
+        <p:nvCxnSpPr>
+          <p:cNvPr id="91" name="Straight Connector 26"/>
+          <p:cNvCxnSpPr/>
+          <p:nvPr/>
+        </p:nvCxnSpPr>
+        <p:spPr>
+          <a:xfrm>
+            <a:off x="2061821" y="3892237"/>
+            <a:ext cx="0" cy="365760"/>
+          </a:xfrm>
+          <a:prstGeom prst="line">
+            <a:avLst/>
+          </a:prstGeom>
+          <a:ln w="19050">
+            <a:solidFill>
+              <a:schemeClr val="tx1"/>
+            </a:solidFill>
+            <a:headEnd type="none"/>
+            <a:tailEnd type="arrow"/>
+          </a:ln>
+        </p:spPr>
+        <p:style>
+          <a:lnRef idx="1">
+            <a:schemeClr val="accent1"/>
+          </a:lnRef>
+          <a:fillRef idx="0">
+            <a:schemeClr val="accent1"/>
+          </a:fillRef>
+          <a:effectRef idx="0">
+            <a:schemeClr val="accent1"/>
+          </a:effectRef>
+          <a:fontRef idx="minor">
+            <a:schemeClr val="tx1"/>
+          </a:fontRef>
+        </p:style>
+      </p:cxnSp>
+      <p:cxnSp>
+        <p:nvCxnSpPr>
+          <p:cNvPr id="92" name="Straight Connector 26"/>
+          <p:cNvCxnSpPr/>
+          <p:nvPr/>
+        </p:nvCxnSpPr>
+        <p:spPr>
+          <a:xfrm>
+            <a:off x="2061822" y="4772771"/>
+            <a:ext cx="0" cy="365760"/>
+          </a:xfrm>
+          <a:prstGeom prst="line">
+            <a:avLst/>
+          </a:prstGeom>
+          <a:ln w="19050">
+            <a:solidFill>
+              <a:schemeClr val="tx1"/>
+            </a:solidFill>
+            <a:headEnd type="none"/>
+            <a:tailEnd type="arrow"/>
+          </a:ln>
+        </p:spPr>
+        <p:style>
+          <a:lnRef idx="1">
+            <a:schemeClr val="accent1"/>
+          </a:lnRef>
+          <a:fillRef idx="0">
+            <a:schemeClr val="accent1"/>
+          </a:fillRef>
+          <a:effectRef idx="0">
+            <a:schemeClr val="accent1"/>
+          </a:effectRef>
+          <a:fontRef idx="minor">
+            <a:schemeClr val="tx1"/>
+          </a:fontRef>
+        </p:style>
+      </p:cxnSp>
+      <p:cxnSp>
+        <p:nvCxnSpPr>
+          <p:cNvPr id="93" name="Straight Connector 26"/>
+          <p:cNvCxnSpPr/>
+          <p:nvPr/>
+        </p:nvCxnSpPr>
+        <p:spPr>
+          <a:xfrm>
+            <a:off x="6938622" y="3062504"/>
+            <a:ext cx="0" cy="365760"/>
+          </a:xfrm>
+          <a:prstGeom prst="line">
+            <a:avLst/>
+          </a:prstGeom>
+          <a:ln w="19050">
+            <a:solidFill>
+              <a:schemeClr val="tx1"/>
+            </a:solidFill>
+            <a:headEnd type="arrow"/>
+            <a:tailEnd type="none"/>
+          </a:ln>
+        </p:spPr>
+        <p:style>
+          <a:lnRef idx="1">
+            <a:schemeClr val="accent1"/>
+          </a:lnRef>
+          <a:fillRef idx="0">
+            <a:schemeClr val="accent1"/>
+          </a:fillRef>
+          <a:effectRef idx="0">
+            <a:schemeClr val="accent1"/>
+          </a:effectRef>
+          <a:fontRef idx="minor">
+            <a:schemeClr val="tx1"/>
+          </a:fontRef>
+        </p:style>
+      </p:cxnSp>
+      <p:cxnSp>
+        <p:nvCxnSpPr>
+          <p:cNvPr id="94" name="Straight Connector 26"/>
+          <p:cNvCxnSpPr/>
+          <p:nvPr/>
+        </p:nvCxnSpPr>
+        <p:spPr>
+          <a:xfrm>
+            <a:off x="6921688" y="3909170"/>
+            <a:ext cx="0" cy="365760"/>
+          </a:xfrm>
+          <a:prstGeom prst="line">
+            <a:avLst/>
+          </a:prstGeom>
+          <a:ln w="19050">
+            <a:solidFill>
+              <a:schemeClr val="tx1"/>
+            </a:solidFill>
+            <a:headEnd type="arrow"/>
+            <a:tailEnd type="none"/>
+          </a:ln>
+        </p:spPr>
+        <p:style>
+          <a:lnRef idx="1">
+            <a:schemeClr val="accent1"/>
+          </a:lnRef>
+          <a:fillRef idx="0">
+            <a:schemeClr val="accent1"/>
+          </a:fillRef>
+          <a:effectRef idx="0">
+            <a:schemeClr val="accent1"/>
+          </a:effectRef>
+          <a:fontRef idx="minor">
+            <a:schemeClr val="tx1"/>
+          </a:fontRef>
+        </p:style>
+      </p:cxnSp>
+      <p:cxnSp>
+        <p:nvCxnSpPr>
+          <p:cNvPr id="95" name="Straight Connector 26"/>
+          <p:cNvCxnSpPr/>
+          <p:nvPr/>
+        </p:nvCxnSpPr>
+        <p:spPr>
+          <a:xfrm>
+            <a:off x="6921689" y="4789704"/>
+            <a:ext cx="0" cy="365760"/>
+          </a:xfrm>
+          <a:prstGeom prst="line">
+            <a:avLst/>
+          </a:prstGeom>
+          <a:ln w="19050">
+            <a:solidFill>
+              <a:schemeClr val="tx1"/>
+            </a:solidFill>
+            <a:headEnd type="arrow"/>
+            <a:tailEnd type="none"/>
+          </a:ln>
+        </p:spPr>
+        <p:style>
+          <a:lnRef idx="1">
+            <a:schemeClr val="accent1"/>
+          </a:lnRef>
+          <a:fillRef idx="0">
+            <a:schemeClr val="accent1"/>
+          </a:fillRef>
+          <a:effectRef idx="0">
+            <a:schemeClr val="accent1"/>
+          </a:effectRef>
+          <a:fontRef idx="minor">
+            <a:schemeClr val="tx1"/>
+          </a:fontRef>
+        </p:style>
+      </p:cxnSp>
+      <p:cxnSp>
+        <p:nvCxnSpPr>
+          <p:cNvPr id="96" name="Straight Connector 26"/>
+          <p:cNvCxnSpPr/>
+          <p:nvPr/>
+        </p:nvCxnSpPr>
+        <p:spPr>
+          <a:xfrm>
+            <a:off x="3484222" y="5348505"/>
+            <a:ext cx="2403141" cy="8859"/>
+          </a:xfrm>
+          <a:prstGeom prst="line">
+            <a:avLst/>
+          </a:prstGeom>
+          <a:ln w="19050">
+            <a:solidFill>
+              <a:schemeClr val="tx1"/>
+            </a:solidFill>
+            <a:headEnd type="none"/>
+            <a:tailEnd type="arrow"/>
+          </a:ln>
+        </p:spPr>
+        <p:style>
+          <a:lnRef idx="1">
+            <a:schemeClr val="accent1"/>
+          </a:lnRef>
+          <a:fillRef idx="0">
+            <a:schemeClr val="accent1"/>
+          </a:fillRef>
+          <a:effectRef idx="0">
+            <a:schemeClr val="accent1"/>
+          </a:effectRef>
+          <a:fontRef idx="minor">
+            <a:schemeClr val="tx1"/>
+          </a:fontRef>
+        </p:style>
+      </p:cxnSp>
+      <p:cxnSp>
+        <p:nvCxnSpPr>
+          <p:cNvPr id="97" name="Straight Connector 26"/>
+          <p:cNvCxnSpPr/>
+          <p:nvPr/>
+        </p:nvCxnSpPr>
+        <p:spPr>
+          <a:xfrm>
+            <a:off x="6947858" y="1886151"/>
+            <a:ext cx="0" cy="685800"/>
+          </a:xfrm>
+          <a:prstGeom prst="line">
+            <a:avLst/>
+          </a:prstGeom>
+          <a:ln w="19050">
+            <a:solidFill>
+              <a:schemeClr val="tx1"/>
+            </a:solidFill>
+            <a:headEnd type="arrow"/>
+            <a:tailEnd type="none"/>
+          </a:ln>
+        </p:spPr>
+        <p:style>
+          <a:lnRef idx="1">
+            <a:schemeClr val="accent1"/>
+          </a:lnRef>
+          <a:fillRef idx="0">
+            <a:schemeClr val="accent1"/>
+          </a:fillRef>
+          <a:effectRef idx="0">
+            <a:schemeClr val="accent1"/>
+          </a:effectRef>
+          <a:fontRef idx="minor">
+            <a:schemeClr val="tx1"/>
+          </a:fontRef>
+        </p:style>
+      </p:cxnSp>
+      <p:cxnSp>
+        <p:nvCxnSpPr>
+          <p:cNvPr id="98" name="Straight Connector 26"/>
+          <p:cNvCxnSpPr>
+            <a:stCxn id="69" idx="3"/>
+            <a:endCxn id="76" idx="1"/>
+          </p:cNvCxnSpPr>
+          <p:nvPr/>
+        </p:nvCxnSpPr>
+        <p:spPr>
+          <a:xfrm flipV="1">
+            <a:off x="3483834" y="3119611"/>
+            <a:ext cx="548994" cy="541938"/>
+          </a:xfrm>
+          <a:prstGeom prst="bentConnector3">
+            <a:avLst>
+              <a:gd name="adj1" fmla="val 50000"/>
+            </a:avLst>
+          </a:prstGeom>
+          <a:ln w="28575" cmpd="sng">
+            <a:solidFill>
+              <a:schemeClr val="tx1"/>
+            </a:solidFill>
+            <a:prstDash val="dash"/>
+            <a:headEnd type="none"/>
+            <a:tailEnd type="arrow"/>
+          </a:ln>
+        </p:spPr>
+        <p:style>
+          <a:lnRef idx="1">
+            <a:schemeClr val="accent1"/>
+          </a:lnRef>
+          <a:fillRef idx="0">
+            <a:schemeClr val="accent1"/>
+          </a:fillRef>
+          <a:effectRef idx="0">
+            <a:schemeClr val="accent1"/>
+          </a:effectRef>
+          <a:fontRef idx="minor">
+            <a:schemeClr val="tx1"/>
+          </a:fontRef>
+        </p:style>
+      </p:cxnSp>
+      <p:cxnSp>
+        <p:nvCxnSpPr>
+          <p:cNvPr id="32" name="Straight Connector 26"/>
+          <p:cNvCxnSpPr/>
+          <p:nvPr/>
+        </p:nvCxnSpPr>
+        <p:spPr>
+          <a:xfrm>
+            <a:off x="3484225" y="5483972"/>
+            <a:ext cx="2403141" cy="8859"/>
+          </a:xfrm>
+          <a:prstGeom prst="line">
+            <a:avLst/>
+          </a:prstGeom>
+          <a:ln w="19050">
+            <a:solidFill>
+              <a:schemeClr val="tx1"/>
+            </a:solidFill>
+            <a:headEnd type="none"/>
+            <a:tailEnd type="arrow"/>
+          </a:ln>
+        </p:spPr>
+        <p:style>
+          <a:lnRef idx="1">
+            <a:schemeClr val="accent1"/>
+          </a:lnRef>
+          <a:fillRef idx="0">
+            <a:schemeClr val="accent1"/>
+          </a:fillRef>
+          <a:effectRef idx="0">
+            <a:schemeClr val="accent1"/>
+          </a:effectRef>
+          <a:fontRef idx="minor">
+            <a:schemeClr val="tx1"/>
+          </a:fontRef>
+        </p:style>
+      </p:cxnSp>
+      <p:sp>
+        <p:nvSpPr>
+          <p:cNvPr id="33" name="TextBox 54"/>
+          <p:cNvSpPr txBox="1"/>
+          <p:nvPr/>
+        </p:nvSpPr>
+        <p:spPr>
+          <a:xfrm>
+            <a:off x="4267192" y="4890234"/>
+            <a:ext cx="897467" cy="369332"/>
+          </a:xfrm>
+          <a:prstGeom prst="rect">
+            <a:avLst/>
+          </a:prstGeom>
+          <a:noFill/>
+        </p:spPr>
+        <p:txBody>
+          <a:bodyPr wrap="square" rtlCol="0">
+            <a:spAutoFit/>
+          </a:bodyPr>
+          <a:lstStyle/>
+          <a:p>
+            <a:r>
+              <a:rPr lang="en-US" dirty="0"/>
+              <a:t>DPDK</a:t>
+            </a:r>
+          </a:p>
+        </p:txBody>
+      </p:sp>
+      <p:sp>
+        <p:nvSpPr>
+          <p:cNvPr id="34" name="TextBox 54"/>
+          <p:cNvSpPr txBox="1"/>
+          <p:nvPr/>
+        </p:nvSpPr>
+        <p:spPr>
+          <a:xfrm>
+            <a:off x="4216393" y="5550634"/>
+            <a:ext cx="897467" cy="369332"/>
+          </a:xfrm>
+          <a:prstGeom prst="rect">
+            <a:avLst/>
+          </a:prstGeom>
+          <a:noFill/>
+        </p:spPr>
+        <p:txBody>
+          <a:bodyPr wrap="square" rtlCol="0">
+            <a:spAutoFit/>
+          </a:bodyPr>
+          <a:lstStyle/>
+          <a:p>
+            <a:r>
+              <a:rPr lang="en-US" dirty="0"/>
+              <a:t>RDMA</a:t>
+            </a:r>
+          </a:p>
+        </p:txBody>
+      </p:sp>
+    </p:spTree>
+    <p:extLst>
+      <p:ext uri="{BB962C8B-B14F-4D97-AF65-F5344CB8AC3E}">
+        <p14:creationId xmlns:p14="http://schemas.microsoft.com/office/powerpoint/2010/main" val="1164031415"/>
+      </p:ext>
+    </p:extLst>
+  </p:cSld>
+  <p:clrMapOvr>
+    <a:masterClrMapping/>
+  </p:clrMapOvr>
+</p:sld>
+</file>
+
+<file path=ppt/slides/slide11.xml><?xml version="1.0" encoding="utf-8"?>
+<p:sld xmlns:a="http://schemas.openxmlformats.org/drawingml/2006/main" xmlns:r="http://schemas.openxmlformats.org/officeDocument/2006/relationships" xmlns:p="http://schemas.openxmlformats.org/presentationml/2006/main">
+  <p:cSld>
+    <p:spTree>
+      <p:nvGrpSpPr>
+        <p:cNvPr id="1" name=""/>
+        <p:cNvGrpSpPr/>
+        <p:nvPr/>
+      </p:nvGrpSpPr>
+      <p:grpSpPr>
+        <a:xfrm>
+          <a:off x="0" y="0"/>
+          <a:ext cx="0" cy="0"/>
+          <a:chOff x="0" y="0"/>
+          <a:chExt cx="0" cy="0"/>
+        </a:xfrm>
+      </p:grpSpPr>
+      <p:sp>
+        <p:nvSpPr>
           <p:cNvPr id="55" name="TextBox 54"/>
           <p:cNvSpPr txBox="1"/>
           <p:nvPr/>
@@ -3699,6 +5300,794 @@
 </file>
 
 <file path=ppt/slides/slide2.xml><?xml version="1.0" encoding="utf-8"?>
+<p:sld xmlns:a="http://schemas.openxmlformats.org/drawingml/2006/main" xmlns:r="http://schemas.openxmlformats.org/officeDocument/2006/relationships" xmlns:p="http://schemas.openxmlformats.org/presentationml/2006/main">
+  <p:cSld>
+    <p:spTree>
+      <p:nvGrpSpPr>
+        <p:cNvPr id="1" name=""/>
+        <p:cNvGrpSpPr/>
+        <p:nvPr/>
+      </p:nvGrpSpPr>
+      <p:grpSpPr>
+        <a:xfrm>
+          <a:off x="0" y="0"/>
+          <a:ext cx="0" cy="0"/>
+          <a:chOff x="0" y="0"/>
+          <a:chExt cx="0" cy="0"/>
+        </a:xfrm>
+      </p:grpSpPr>
+      <p:cxnSp>
+        <p:nvCxnSpPr>
+          <p:cNvPr id="89" name="Straight Connector 26"/>
+          <p:cNvCxnSpPr/>
+          <p:nvPr/>
+        </p:nvCxnSpPr>
+        <p:spPr>
+          <a:xfrm flipH="1" flipV="1">
+            <a:off x="3837854" y="3433312"/>
+            <a:ext cx="914400" cy="0"/>
+          </a:xfrm>
+          <a:prstGeom prst="line">
+            <a:avLst/>
+          </a:prstGeom>
+          <a:ln w="28575" cmpd="sng">
+            <a:solidFill>
+              <a:srgbClr val="FF0000"/>
+            </a:solidFill>
+            <a:prstDash val="dash"/>
+            <a:headEnd type="none"/>
+            <a:tailEnd type="arrow"/>
+          </a:ln>
+        </p:spPr>
+        <p:style>
+          <a:lnRef idx="1">
+            <a:schemeClr val="accent1"/>
+          </a:lnRef>
+          <a:fillRef idx="0">
+            <a:schemeClr val="accent1"/>
+          </a:fillRef>
+          <a:effectRef idx="0">
+            <a:schemeClr val="accent1"/>
+          </a:effectRef>
+          <a:fontRef idx="minor">
+            <a:schemeClr val="tx1"/>
+          </a:fontRef>
+        </p:style>
+      </p:cxnSp>
+      <p:sp>
+        <p:nvSpPr>
+          <p:cNvPr id="14" name="Rectangle 13"/>
+          <p:cNvSpPr/>
+          <p:nvPr/>
+        </p:nvSpPr>
+        <p:spPr>
+          <a:xfrm>
+            <a:off x="1653659" y="2002200"/>
+            <a:ext cx="2194560" cy="731520"/>
+          </a:xfrm>
+          <a:prstGeom prst="rect">
+            <a:avLst/>
+          </a:prstGeom>
+          <a:noFill/>
+          <a:ln w="19050">
+            <a:solidFill>
+              <a:schemeClr val="tx1">
+                <a:lumMod val="75000"/>
+                <a:lumOff val="25000"/>
+              </a:schemeClr>
+            </a:solidFill>
+          </a:ln>
+        </p:spPr>
+        <p:style>
+          <a:lnRef idx="2">
+            <a:schemeClr val="accent1">
+              <a:shade val="50000"/>
+            </a:schemeClr>
+          </a:lnRef>
+          <a:fillRef idx="1">
+            <a:schemeClr val="accent1"/>
+          </a:fillRef>
+          <a:effectRef idx="0">
+            <a:schemeClr val="accent1"/>
+          </a:effectRef>
+          <a:fontRef idx="minor">
+            <a:schemeClr val="lt1"/>
+          </a:fontRef>
+        </p:style>
+        <p:txBody>
+          <a:bodyPr rtlCol="0" anchor="ctr"/>
+          <a:lstStyle/>
+          <a:p>
+            <a:pPr algn="ctr"/>
+            <a:r>
+              <a:rPr lang="en-US" i="1" dirty="0" smtClean="0">
+                <a:solidFill>
+                  <a:schemeClr val="tx1"/>
+                </a:solidFill>
+              </a:rPr>
+              <a:t>Allocate buffer1;</a:t>
+            </a:r>
+            <a:endParaRPr lang="en-US" i="1" dirty="0">
+              <a:solidFill>
+                <a:schemeClr val="tx1"/>
+              </a:solidFill>
+            </a:endParaRPr>
+          </a:p>
+          <a:p>
+            <a:pPr algn="ctr"/>
+            <a:r>
+              <a:rPr lang="en-US" i="1" dirty="0" smtClean="0">
+                <a:solidFill>
+                  <a:schemeClr val="tx1"/>
+                </a:solidFill>
+              </a:rPr>
+              <a:t>Register to NIC</a:t>
+            </a:r>
+          </a:p>
+        </p:txBody>
+      </p:sp>
+      <p:cxnSp>
+        <p:nvCxnSpPr>
+          <p:cNvPr id="71" name="Straight Connector 26"/>
+          <p:cNvCxnSpPr/>
+          <p:nvPr/>
+        </p:nvCxnSpPr>
+        <p:spPr>
+          <a:xfrm>
+            <a:off x="2726225" y="2725596"/>
+            <a:ext cx="0" cy="301752"/>
+          </a:xfrm>
+          <a:prstGeom prst="line">
+            <a:avLst/>
+          </a:prstGeom>
+          <a:ln w="19050">
+            <a:solidFill>
+              <a:srgbClr val="FF0000"/>
+            </a:solidFill>
+            <a:prstDash val="dash"/>
+            <a:headEnd type="none"/>
+            <a:tailEnd type="arrow"/>
+          </a:ln>
+        </p:spPr>
+        <p:style>
+          <a:lnRef idx="1">
+            <a:schemeClr val="accent1"/>
+          </a:lnRef>
+          <a:fillRef idx="0">
+            <a:schemeClr val="accent1"/>
+          </a:fillRef>
+          <a:effectRef idx="0">
+            <a:schemeClr val="accent1"/>
+          </a:effectRef>
+          <a:fontRef idx="minor">
+            <a:schemeClr val="tx1"/>
+          </a:fontRef>
+        </p:style>
+      </p:cxnSp>
+      <p:sp>
+        <p:nvSpPr>
+          <p:cNvPr id="42" name="Rectangle 13"/>
+          <p:cNvSpPr/>
+          <p:nvPr/>
+        </p:nvSpPr>
+        <p:spPr>
+          <a:xfrm>
+            <a:off x="4775738" y="2002200"/>
+            <a:ext cx="2194560" cy="731520"/>
+          </a:xfrm>
+          <a:prstGeom prst="rect">
+            <a:avLst/>
+          </a:prstGeom>
+          <a:noFill/>
+          <a:ln w="19050">
+            <a:solidFill>
+              <a:schemeClr val="tx1">
+                <a:lumMod val="75000"/>
+                <a:lumOff val="25000"/>
+              </a:schemeClr>
+            </a:solidFill>
+          </a:ln>
+        </p:spPr>
+        <p:style>
+          <a:lnRef idx="2">
+            <a:schemeClr val="accent1">
+              <a:shade val="50000"/>
+            </a:schemeClr>
+          </a:lnRef>
+          <a:fillRef idx="1">
+            <a:schemeClr val="accent1"/>
+          </a:fillRef>
+          <a:effectRef idx="0">
+            <a:schemeClr val="accent1"/>
+          </a:effectRef>
+          <a:fontRef idx="minor">
+            <a:schemeClr val="lt1"/>
+          </a:fontRef>
+        </p:style>
+        <p:txBody>
+          <a:bodyPr rtlCol="0" anchor="ctr"/>
+          <a:lstStyle/>
+          <a:p>
+            <a:pPr algn="ctr"/>
+            <a:r>
+              <a:rPr lang="en-US" altLang="zh-CN" i="1" dirty="0">
+                <a:solidFill>
+                  <a:schemeClr val="tx1"/>
+                </a:solidFill>
+              </a:rPr>
+              <a:t>Allocate </a:t>
+            </a:r>
+            <a:r>
+              <a:rPr lang="en-US" altLang="zh-CN" i="1" dirty="0" smtClean="0">
+                <a:solidFill>
+                  <a:schemeClr val="tx1"/>
+                </a:solidFill>
+              </a:rPr>
+              <a:t>buffer2;</a:t>
+            </a:r>
+            <a:endParaRPr lang="en-US" altLang="zh-CN" i="1" dirty="0">
+              <a:solidFill>
+                <a:schemeClr val="tx1"/>
+              </a:solidFill>
+            </a:endParaRPr>
+          </a:p>
+          <a:p>
+            <a:pPr algn="ctr"/>
+            <a:r>
+              <a:rPr lang="en-US" altLang="zh-CN" i="1" dirty="0">
+                <a:solidFill>
+                  <a:schemeClr val="tx1"/>
+                </a:solidFill>
+              </a:rPr>
+              <a:t>Register to NIC</a:t>
+            </a:r>
+          </a:p>
+        </p:txBody>
+      </p:sp>
+      <p:cxnSp>
+        <p:nvCxnSpPr>
+          <p:cNvPr id="45" name="Straight Connector 26"/>
+          <p:cNvCxnSpPr/>
+          <p:nvPr/>
+        </p:nvCxnSpPr>
+        <p:spPr>
+          <a:xfrm>
+            <a:off x="5848304" y="2725596"/>
+            <a:ext cx="0" cy="301752"/>
+          </a:xfrm>
+          <a:prstGeom prst="line">
+            <a:avLst/>
+          </a:prstGeom>
+          <a:ln w="19050">
+            <a:solidFill>
+              <a:srgbClr val="FF0000"/>
+            </a:solidFill>
+            <a:prstDash val="dash"/>
+            <a:headEnd type="none"/>
+            <a:tailEnd type="arrow"/>
+          </a:ln>
+        </p:spPr>
+        <p:style>
+          <a:lnRef idx="1">
+            <a:schemeClr val="accent1"/>
+          </a:lnRef>
+          <a:fillRef idx="0">
+            <a:schemeClr val="accent1"/>
+          </a:fillRef>
+          <a:effectRef idx="0">
+            <a:schemeClr val="accent1"/>
+          </a:effectRef>
+          <a:fontRef idx="minor">
+            <a:schemeClr val="tx1"/>
+          </a:fontRef>
+        </p:style>
+      </p:cxnSp>
+      <p:sp>
+        <p:nvSpPr>
+          <p:cNvPr id="70" name="TextBox 54"/>
+          <p:cNvSpPr txBox="1"/>
+          <p:nvPr/>
+        </p:nvSpPr>
+        <p:spPr>
+          <a:xfrm>
+            <a:off x="891488" y="2187498"/>
+            <a:ext cx="749908" cy="346249"/>
+          </a:xfrm>
+          <a:prstGeom prst="rect">
+            <a:avLst/>
+          </a:prstGeom>
+          <a:noFill/>
+        </p:spPr>
+        <p:txBody>
+          <a:bodyPr wrap="square" rtlCol="0">
+            <a:spAutoFit/>
+          </a:bodyPr>
+          <a:lstStyle/>
+          <a:p>
+            <a:pPr algn="ctr">
+              <a:lnSpc>
+                <a:spcPct val="90000"/>
+              </a:lnSpc>
+            </a:pPr>
+            <a:r>
+              <a:rPr lang="en-US" dirty="0" smtClean="0">
+                <a:solidFill>
+                  <a:srgbClr val="FF0000"/>
+                </a:solidFill>
+              </a:rPr>
+              <a:t>S</a:t>
+            </a:r>
+            <a:r>
+              <a:rPr lang="en-US" dirty="0" smtClean="0">
+                <a:solidFill>
+                  <a:srgbClr val="FF0000"/>
+                </a:solidFill>
+              </a:rPr>
+              <a:t>tep1</a:t>
+            </a:r>
+          </a:p>
+        </p:txBody>
+      </p:sp>
+      <p:sp>
+        <p:nvSpPr>
+          <p:cNvPr id="72" name="TextBox 54"/>
+          <p:cNvSpPr txBox="1"/>
+          <p:nvPr/>
+        </p:nvSpPr>
+        <p:spPr>
+          <a:xfrm>
+            <a:off x="3547532" y="3015998"/>
+            <a:ext cx="1498599" cy="369332"/>
+          </a:xfrm>
+          <a:prstGeom prst="rect">
+            <a:avLst/>
+          </a:prstGeom>
+          <a:noFill/>
+        </p:spPr>
+        <p:txBody>
+          <a:bodyPr wrap="square" rtlCol="0">
+            <a:spAutoFit/>
+          </a:bodyPr>
+          <a:lstStyle/>
+          <a:p>
+            <a:pPr algn="ctr"/>
+            <a:r>
+              <a:rPr lang="en-US" dirty="0" smtClean="0">
+                <a:solidFill>
+                  <a:srgbClr val="FF0000"/>
+                </a:solidFill>
+              </a:rPr>
+              <a:t>R-</a:t>
+            </a:r>
+            <a:r>
+              <a:rPr lang="en-US" dirty="0" err="1" smtClean="0">
+                <a:solidFill>
+                  <a:srgbClr val="FF0000"/>
+                </a:solidFill>
+              </a:rPr>
+              <a:t>addr</a:t>
+            </a:r>
+            <a:endParaRPr lang="en-US" dirty="0">
+              <a:solidFill>
+                <a:srgbClr val="FF0000"/>
+              </a:solidFill>
+            </a:endParaRPr>
+          </a:p>
+        </p:txBody>
+      </p:sp>
+      <p:sp>
+        <p:nvSpPr>
+          <p:cNvPr id="79" name="TextBox 54"/>
+          <p:cNvSpPr txBox="1"/>
+          <p:nvPr/>
+        </p:nvSpPr>
+        <p:spPr>
+          <a:xfrm>
+            <a:off x="1681240" y="1517420"/>
+            <a:ext cx="2056190" cy="323165"/>
+          </a:xfrm>
+          <a:prstGeom prst="rect">
+            <a:avLst/>
+          </a:prstGeom>
+          <a:noFill/>
+        </p:spPr>
+        <p:txBody>
+          <a:bodyPr wrap="square" rtlCol="0">
+            <a:spAutoFit/>
+          </a:bodyPr>
+          <a:lstStyle/>
+          <a:p>
+            <a:pPr algn="ctr">
+              <a:lnSpc>
+                <a:spcPct val="80000"/>
+              </a:lnSpc>
+            </a:pPr>
+            <a:r>
+              <a:rPr lang="en-US" dirty="0" smtClean="0"/>
+              <a:t>Container: Sender</a:t>
+            </a:r>
+            <a:endParaRPr lang="en-US" dirty="0" smtClean="0"/>
+          </a:p>
+        </p:txBody>
+      </p:sp>
+      <p:sp>
+        <p:nvSpPr>
+          <p:cNvPr id="81" name="TextBox 54"/>
+          <p:cNvSpPr txBox="1"/>
+          <p:nvPr/>
+        </p:nvSpPr>
+        <p:spPr>
+          <a:xfrm>
+            <a:off x="4796983" y="1524678"/>
+            <a:ext cx="2056190" cy="323165"/>
+          </a:xfrm>
+          <a:prstGeom prst="rect">
+            <a:avLst/>
+          </a:prstGeom>
+          <a:noFill/>
+        </p:spPr>
+        <p:txBody>
+          <a:bodyPr wrap="square" rtlCol="0">
+            <a:spAutoFit/>
+          </a:bodyPr>
+          <a:lstStyle/>
+          <a:p>
+            <a:pPr algn="ctr">
+              <a:lnSpc>
+                <a:spcPct val="80000"/>
+              </a:lnSpc>
+            </a:pPr>
+            <a:r>
+              <a:rPr lang="en-US" dirty="0" smtClean="0"/>
+              <a:t>Container: Receiver</a:t>
+            </a:r>
+            <a:endParaRPr lang="en-US" dirty="0" smtClean="0"/>
+          </a:p>
+        </p:txBody>
+      </p:sp>
+      <p:sp>
+        <p:nvSpPr>
+          <p:cNvPr id="4" name="文本框 3"/>
+          <p:cNvSpPr txBox="1"/>
+          <p:nvPr/>
+        </p:nvSpPr>
+        <p:spPr>
+          <a:xfrm>
+            <a:off x="5539629" y="2152952"/>
+            <a:ext cx="184666" cy="369332"/>
+          </a:xfrm>
+          <a:prstGeom prst="rect">
+            <a:avLst/>
+          </a:prstGeom>
+          <a:noFill/>
+        </p:spPr>
+        <p:txBody>
+          <a:bodyPr wrap="none" rtlCol="0">
+            <a:spAutoFit/>
+          </a:bodyPr>
+          <a:lstStyle/>
+          <a:p>
+            <a:endParaRPr kumimoji="1" lang="zh-CN" altLang="en-US" dirty="0"/>
+          </a:p>
+        </p:txBody>
+      </p:sp>
+      <p:sp>
+        <p:nvSpPr>
+          <p:cNvPr id="33" name="Rectangle 13"/>
+          <p:cNvSpPr/>
+          <p:nvPr/>
+        </p:nvSpPr>
+        <p:spPr>
+          <a:xfrm>
+            <a:off x="1660919" y="3061749"/>
+            <a:ext cx="2194560" cy="731520"/>
+          </a:xfrm>
+          <a:prstGeom prst="rect">
+            <a:avLst/>
+          </a:prstGeom>
+          <a:noFill/>
+          <a:ln w="19050">
+            <a:solidFill>
+              <a:schemeClr val="tx1">
+                <a:lumMod val="75000"/>
+                <a:lumOff val="25000"/>
+              </a:schemeClr>
+            </a:solidFill>
+          </a:ln>
+        </p:spPr>
+        <p:style>
+          <a:lnRef idx="2">
+            <a:schemeClr val="accent1">
+              <a:shade val="50000"/>
+            </a:schemeClr>
+          </a:lnRef>
+          <a:fillRef idx="1">
+            <a:schemeClr val="accent1"/>
+          </a:fillRef>
+          <a:effectRef idx="0">
+            <a:schemeClr val="accent1"/>
+          </a:effectRef>
+          <a:fontRef idx="minor">
+            <a:schemeClr val="lt1"/>
+          </a:fontRef>
+        </p:style>
+        <p:txBody>
+          <a:bodyPr rtlCol="0" anchor="ctr"/>
+          <a:lstStyle/>
+          <a:p>
+            <a:pPr algn="ctr"/>
+            <a:r>
+              <a:rPr lang="en-US" i="1" dirty="0" smtClean="0">
+                <a:solidFill>
+                  <a:schemeClr val="tx1"/>
+                </a:solidFill>
+              </a:rPr>
+              <a:t>Receive buffer2’s address (R-</a:t>
+            </a:r>
+            <a:r>
+              <a:rPr lang="en-US" i="1" dirty="0" err="1" smtClean="0">
+                <a:solidFill>
+                  <a:schemeClr val="tx1"/>
+                </a:solidFill>
+              </a:rPr>
+              <a:t>addr</a:t>
+            </a:r>
+            <a:r>
+              <a:rPr lang="en-US" i="1" dirty="0" smtClean="0">
+                <a:solidFill>
+                  <a:schemeClr val="tx1"/>
+                </a:solidFill>
+              </a:rPr>
+              <a:t>)</a:t>
+            </a:r>
+          </a:p>
+        </p:txBody>
+      </p:sp>
+      <p:sp>
+        <p:nvSpPr>
+          <p:cNvPr id="34" name="Rectangle 13"/>
+          <p:cNvSpPr/>
+          <p:nvPr/>
+        </p:nvSpPr>
+        <p:spPr>
+          <a:xfrm>
+            <a:off x="4782998" y="3037559"/>
+            <a:ext cx="2194560" cy="731520"/>
+          </a:xfrm>
+          <a:prstGeom prst="rect">
+            <a:avLst/>
+          </a:prstGeom>
+          <a:noFill/>
+          <a:ln w="19050">
+            <a:solidFill>
+              <a:schemeClr val="tx1">
+                <a:lumMod val="75000"/>
+                <a:lumOff val="25000"/>
+              </a:schemeClr>
+            </a:solidFill>
+          </a:ln>
+        </p:spPr>
+        <p:style>
+          <a:lnRef idx="2">
+            <a:schemeClr val="accent1">
+              <a:shade val="50000"/>
+            </a:schemeClr>
+          </a:lnRef>
+          <a:fillRef idx="1">
+            <a:schemeClr val="accent1"/>
+          </a:fillRef>
+          <a:effectRef idx="0">
+            <a:schemeClr val="accent1"/>
+          </a:effectRef>
+          <a:fontRef idx="minor">
+            <a:schemeClr val="lt1"/>
+          </a:fontRef>
+        </p:style>
+        <p:txBody>
+          <a:bodyPr rtlCol="0" anchor="ctr"/>
+          <a:lstStyle/>
+          <a:p>
+            <a:pPr algn="ctr"/>
+            <a:r>
+              <a:rPr lang="en-US" altLang="zh-CN" i="1" dirty="0" smtClean="0">
+                <a:solidFill>
+                  <a:schemeClr val="tx1"/>
+                </a:solidFill>
+              </a:rPr>
+              <a:t>Pass buffer2’s address to Sender</a:t>
+            </a:r>
+            <a:endParaRPr lang="en-US" altLang="zh-CN" i="1" dirty="0">
+              <a:solidFill>
+                <a:schemeClr val="tx1"/>
+              </a:solidFill>
+            </a:endParaRPr>
+          </a:p>
+        </p:txBody>
+      </p:sp>
+      <p:sp>
+        <p:nvSpPr>
+          <p:cNvPr id="7" name="矩形 6"/>
+          <p:cNvSpPr/>
+          <p:nvPr/>
+        </p:nvSpPr>
+        <p:spPr>
+          <a:xfrm>
+            <a:off x="905857" y="3183857"/>
+            <a:ext cx="721171" cy="369332"/>
+          </a:xfrm>
+          <a:prstGeom prst="rect">
+            <a:avLst/>
+          </a:prstGeom>
+        </p:spPr>
+        <p:txBody>
+          <a:bodyPr wrap="none">
+            <a:spAutoFit/>
+          </a:bodyPr>
+          <a:lstStyle/>
+          <a:p>
+            <a:pPr algn="ctr"/>
+            <a:r>
+              <a:rPr lang="en-US" altLang="zh-CN" dirty="0" smtClean="0">
+                <a:solidFill>
+                  <a:srgbClr val="FF0000"/>
+                </a:solidFill>
+              </a:rPr>
+              <a:t>Step2</a:t>
+            </a:r>
+            <a:endParaRPr lang="en-US" altLang="zh-CN" dirty="0">
+              <a:solidFill>
+                <a:srgbClr val="FF0000"/>
+              </a:solidFill>
+            </a:endParaRPr>
+          </a:p>
+        </p:txBody>
+      </p:sp>
+      <p:cxnSp>
+        <p:nvCxnSpPr>
+          <p:cNvPr id="39" name="Straight Connector 26"/>
+          <p:cNvCxnSpPr/>
+          <p:nvPr/>
+        </p:nvCxnSpPr>
+        <p:spPr>
+          <a:xfrm>
+            <a:off x="2733485" y="3809311"/>
+            <a:ext cx="0" cy="301752"/>
+          </a:xfrm>
+          <a:prstGeom prst="line">
+            <a:avLst/>
+          </a:prstGeom>
+          <a:ln w="19050">
+            <a:solidFill>
+              <a:srgbClr val="FF0000"/>
+            </a:solidFill>
+            <a:prstDash val="dash"/>
+            <a:headEnd type="none"/>
+            <a:tailEnd type="arrow"/>
+          </a:ln>
+        </p:spPr>
+        <p:style>
+          <a:lnRef idx="1">
+            <a:schemeClr val="accent1"/>
+          </a:lnRef>
+          <a:fillRef idx="0">
+            <a:schemeClr val="accent1"/>
+          </a:fillRef>
+          <a:effectRef idx="0">
+            <a:schemeClr val="accent1"/>
+          </a:effectRef>
+          <a:fontRef idx="minor">
+            <a:schemeClr val="tx1"/>
+          </a:fontRef>
+        </p:style>
+      </p:cxnSp>
+      <p:sp>
+        <p:nvSpPr>
+          <p:cNvPr id="51" name="Rectangle 13"/>
+          <p:cNvSpPr/>
+          <p:nvPr/>
+        </p:nvSpPr>
+        <p:spPr>
+          <a:xfrm>
+            <a:off x="1668179" y="4145464"/>
+            <a:ext cx="2194560" cy="731520"/>
+          </a:xfrm>
+          <a:prstGeom prst="rect">
+            <a:avLst/>
+          </a:prstGeom>
+          <a:noFill/>
+          <a:ln w="19050">
+            <a:solidFill>
+              <a:schemeClr val="tx1">
+                <a:lumMod val="75000"/>
+                <a:lumOff val="25000"/>
+              </a:schemeClr>
+            </a:solidFill>
+          </a:ln>
+        </p:spPr>
+        <p:style>
+          <a:lnRef idx="2">
+            <a:schemeClr val="accent1">
+              <a:shade val="50000"/>
+            </a:schemeClr>
+          </a:lnRef>
+          <a:fillRef idx="1">
+            <a:schemeClr val="accent1"/>
+          </a:fillRef>
+          <a:effectRef idx="0">
+            <a:schemeClr val="accent1"/>
+          </a:effectRef>
+          <a:fontRef idx="minor">
+            <a:schemeClr val="lt1"/>
+          </a:fontRef>
+        </p:style>
+        <p:txBody>
+          <a:bodyPr rtlCol="0" anchor="ctr"/>
+          <a:lstStyle/>
+          <a:p>
+            <a:pPr algn="ctr"/>
+            <a:r>
+              <a:rPr lang="en-US" i="1" dirty="0" smtClean="0">
+                <a:solidFill>
+                  <a:schemeClr val="tx1"/>
+                </a:solidFill>
+              </a:rPr>
+              <a:t>NIC directly copy buffer1 to buffer2 </a:t>
+            </a:r>
+          </a:p>
+        </p:txBody>
+      </p:sp>
+      <p:sp>
+        <p:nvSpPr>
+          <p:cNvPr id="52" name="矩形 51"/>
+          <p:cNvSpPr/>
+          <p:nvPr/>
+        </p:nvSpPr>
+        <p:spPr>
+          <a:xfrm>
+            <a:off x="905857" y="4267592"/>
+            <a:ext cx="721171" cy="369332"/>
+          </a:xfrm>
+          <a:prstGeom prst="rect">
+            <a:avLst/>
+          </a:prstGeom>
+        </p:spPr>
+        <p:txBody>
+          <a:bodyPr wrap="none">
+            <a:spAutoFit/>
+          </a:bodyPr>
+          <a:lstStyle/>
+          <a:p>
+            <a:pPr algn="ctr"/>
+            <a:r>
+              <a:rPr lang="en-US" altLang="zh-CN" dirty="0" smtClean="0">
+                <a:solidFill>
+                  <a:srgbClr val="FF0000"/>
+                </a:solidFill>
+              </a:rPr>
+              <a:t>Step3</a:t>
+            </a:r>
+            <a:endParaRPr lang="en-US" altLang="zh-CN" dirty="0">
+              <a:solidFill>
+                <a:srgbClr val="FF0000"/>
+              </a:solidFill>
+            </a:endParaRPr>
+          </a:p>
+        </p:txBody>
+      </p:sp>
+    </p:spTree>
+    <p:extLst>
+      <p:ext uri="{BB962C8B-B14F-4D97-AF65-F5344CB8AC3E}">
+        <p14:creationId xmlns:p14="http://schemas.microsoft.com/office/powerpoint/2010/main" val="3402322246"/>
+      </p:ext>
+    </p:extLst>
+  </p:cSld>
+  <p:clrMapOvr>
+    <a:masterClrMapping/>
+  </p:clrMapOvr>
+</p:sld>
+</file>
+
+<file path=ppt/slides/slide3.xml><?xml version="1.0" encoding="utf-8"?>
 <p:sld xmlns:a="http://schemas.openxmlformats.org/drawingml/2006/main" xmlns:r="http://schemas.openxmlformats.org/officeDocument/2006/relationships" xmlns:p="http://schemas.openxmlformats.org/presentationml/2006/main">
   <p:cSld>
     <p:spTree>
@@ -5128,7 +7517,7 @@
 </p:sld>
 </file>
 
-<file path=ppt/slides/slide3.xml><?xml version="1.0" encoding="utf-8"?>
+<file path=ppt/slides/slide4.xml><?xml version="1.0" encoding="utf-8"?>
 <p:sld xmlns:a="http://schemas.openxmlformats.org/drawingml/2006/main" xmlns:r="http://schemas.openxmlformats.org/officeDocument/2006/relationships" xmlns:p="http://schemas.openxmlformats.org/presentationml/2006/main">
   <p:cSld>
     <p:spTree>
@@ -5930,41 +8319,6 @@
       </p:cxnSp>
       <p:sp>
         <p:nvSpPr>
-          <p:cNvPr id="75" name="TextBox 54"/>
-          <p:cNvSpPr txBox="1"/>
-          <p:nvPr/>
-        </p:nvSpPr>
-        <p:spPr>
-          <a:xfrm>
-            <a:off x="2650071" y="4843607"/>
-            <a:ext cx="4301066" cy="369332"/>
-          </a:xfrm>
-          <a:prstGeom prst="rect">
-            <a:avLst/>
-          </a:prstGeom>
-          <a:noFill/>
-        </p:spPr>
-        <p:txBody>
-          <a:bodyPr wrap="square" rtlCol="0">
-            <a:spAutoFit/>
-          </a:bodyPr>
-          <a:lstStyle/>
-          <a:p>
-            <a:pPr algn="ctr"/>
-            <a:r>
-              <a:rPr lang="en-US" dirty="0" smtClean="0"/>
-              <a:t>S</a:t>
-            </a:r>
-            <a:r>
-              <a:rPr lang="en-US" dirty="0" smtClean="0"/>
-              <a:t>tep3: Direct copy buffer1 to buffer2</a:t>
-            </a:r>
-            <a:endParaRPr lang="en-US" dirty="0"/>
-          </a:p>
-        </p:txBody>
-      </p:sp>
-      <p:sp>
-        <p:nvSpPr>
           <p:cNvPr id="79" name="TextBox 54"/>
           <p:cNvSpPr txBox="1"/>
           <p:nvPr/>
@@ -6438,7 +8792,7 @@
 </p:sld>
 </file>
 
-<file path=ppt/slides/slide4.xml><?xml version="1.0" encoding="utf-8"?>
+<file path=ppt/slides/slide5.xml><?xml version="1.0" encoding="utf-8"?>
 <p:sld xmlns:a="http://schemas.openxmlformats.org/drawingml/2006/main" xmlns:r="http://schemas.openxmlformats.org/officeDocument/2006/relationships" xmlns:p="http://schemas.openxmlformats.org/presentationml/2006/main">
   <p:cSld>
     <p:spTree>
@@ -8404,7 +10758,7 @@
 </p:sld>
 </file>
 
-<file path=ppt/slides/slide5.xml><?xml version="1.0" encoding="utf-8"?>
+<file path=ppt/slides/slide6.xml><?xml version="1.0" encoding="utf-8"?>
 <p:sld xmlns:a="http://schemas.openxmlformats.org/drawingml/2006/main" xmlns:r="http://schemas.openxmlformats.org/officeDocument/2006/relationships" xmlns:p="http://schemas.openxmlformats.org/presentationml/2006/main">
   <p:cSld>
     <p:spTree>
@@ -10236,7 +12590,7 @@
 </p:sld>
 </file>
 
-<file path=ppt/slides/slide6.xml><?xml version="1.0" encoding="utf-8"?>
+<file path=ppt/slides/slide7.xml><?xml version="1.0" encoding="utf-8"?>
 <p:sld xmlns:a="http://schemas.openxmlformats.org/drawingml/2006/main" xmlns:r="http://schemas.openxmlformats.org/officeDocument/2006/relationships" xmlns:p="http://schemas.openxmlformats.org/presentationml/2006/main">
   <p:cSld>
     <p:spTree>
@@ -12075,7 +14429,7 @@
 </p:sld>
 </file>
 
-<file path=ppt/slides/slide7.xml><?xml version="1.0" encoding="utf-8"?>
+<file path=ppt/slides/slide8.xml><?xml version="1.0" encoding="utf-8"?>
 <p:sld xmlns:a="http://schemas.openxmlformats.org/drawingml/2006/main" xmlns:r="http://schemas.openxmlformats.org/officeDocument/2006/relationships" xmlns:p="http://schemas.openxmlformats.org/presentationml/2006/main">
   <p:cSld>
     <p:spTree>
@@ -13735,7 +16089,7 @@
 </p:sld>
 </file>
 
-<file path=ppt/slides/slide8.xml><?xml version="1.0" encoding="utf-8"?>
+<file path=ppt/slides/slide9.xml><?xml version="1.0" encoding="utf-8"?>
 <p:sld xmlns:a="http://schemas.openxmlformats.org/drawingml/2006/main" xmlns:r="http://schemas.openxmlformats.org/officeDocument/2006/relationships" xmlns:p="http://schemas.openxmlformats.org/presentationml/2006/main">
   <p:cSld>
     <p:spTree>
@@ -14397,1606 +16751,6 @@
     <p:extLst>
       <p:ext uri="{BB962C8B-B14F-4D97-AF65-F5344CB8AC3E}">
         <p14:creationId xmlns:p14="http://schemas.microsoft.com/office/powerpoint/2010/main" val="543181556"/>
-      </p:ext>
-    </p:extLst>
-  </p:cSld>
-  <p:clrMapOvr>
-    <a:masterClrMapping/>
-  </p:clrMapOvr>
-</p:sld>
-</file>
-
-<file path=ppt/slides/slide9.xml><?xml version="1.0" encoding="utf-8"?>
-<p:sld xmlns:a="http://schemas.openxmlformats.org/drawingml/2006/main" xmlns:r="http://schemas.openxmlformats.org/officeDocument/2006/relationships" xmlns:p="http://schemas.openxmlformats.org/presentationml/2006/main">
-  <p:cSld>
-    <p:spTree>
-      <p:nvGrpSpPr>
-        <p:cNvPr id="1" name=""/>
-        <p:cNvGrpSpPr/>
-        <p:nvPr/>
-      </p:nvGrpSpPr>
-      <p:grpSpPr>
-        <a:xfrm>
-          <a:off x="0" y="0"/>
-          <a:ext cx="0" cy="0"/>
-          <a:chOff x="0" y="0"/>
-          <a:chExt cx="0" cy="0"/>
-        </a:xfrm>
-      </p:grpSpPr>
-      <p:sp>
-        <p:nvSpPr>
-          <p:cNvPr id="9" name="Rectangle 8"/>
-          <p:cNvSpPr/>
-          <p:nvPr/>
-        </p:nvSpPr>
-        <p:spPr>
-          <a:xfrm>
-            <a:off x="610109" y="1232885"/>
-            <a:ext cx="1342578" cy="640080"/>
-          </a:xfrm>
-          <a:prstGeom prst="rect">
-            <a:avLst/>
-          </a:prstGeom>
-          <a:noFill/>
-          <a:ln w="19050">
-            <a:solidFill>
-              <a:schemeClr val="tx1">
-                <a:lumMod val="75000"/>
-                <a:lumOff val="25000"/>
-              </a:schemeClr>
-            </a:solidFill>
-          </a:ln>
-        </p:spPr>
-        <p:style>
-          <a:lnRef idx="2">
-            <a:schemeClr val="accent1">
-              <a:shade val="50000"/>
-            </a:schemeClr>
-          </a:lnRef>
-          <a:fillRef idx="1">
-            <a:schemeClr val="accent1"/>
-          </a:fillRef>
-          <a:effectRef idx="0">
-            <a:schemeClr val="accent1"/>
-          </a:effectRef>
-          <a:fontRef idx="minor">
-            <a:schemeClr val="lt1"/>
-          </a:fontRef>
-        </p:style>
-        <p:txBody>
-          <a:bodyPr rtlCol="0" anchor="ctr"/>
-          <a:lstStyle/>
-          <a:p>
-            <a:pPr algn="ctr"/>
-            <a:r>
-              <a:rPr lang="en-US" dirty="0">
-                <a:solidFill>
-                  <a:schemeClr val="tx1"/>
-                </a:solidFill>
-              </a:rPr>
-              <a:t>TCP/IP Apps</a:t>
-            </a:r>
-          </a:p>
-          <a:p>
-            <a:pPr algn="ctr"/>
-            <a:r>
-              <a:rPr lang="en-US" dirty="0">
-                <a:solidFill>
-                  <a:schemeClr val="tx1"/>
-                </a:solidFill>
-              </a:rPr>
-              <a:t>Container </a:t>
-            </a:r>
-            <a:r>
-              <a:rPr lang="en-US" i="1" dirty="0">
-                <a:solidFill>
-                  <a:schemeClr val="tx1"/>
-                </a:solidFill>
-              </a:rPr>
-              <a:t>1</a:t>
-            </a:r>
-          </a:p>
-        </p:txBody>
-      </p:sp>
-      <p:sp>
-        <p:nvSpPr>
-          <p:cNvPr id="14" name="Rectangle 13"/>
-          <p:cNvSpPr/>
-          <p:nvPr/>
-        </p:nvSpPr>
-        <p:spPr>
-          <a:xfrm>
-            <a:off x="2108414" y="1241585"/>
-            <a:ext cx="1342578" cy="640080"/>
-          </a:xfrm>
-          <a:prstGeom prst="rect">
-            <a:avLst/>
-          </a:prstGeom>
-          <a:noFill/>
-          <a:ln w="19050">
-            <a:solidFill>
-              <a:schemeClr val="tx1">
-                <a:lumMod val="75000"/>
-                <a:lumOff val="25000"/>
-              </a:schemeClr>
-            </a:solidFill>
-          </a:ln>
-        </p:spPr>
-        <p:style>
-          <a:lnRef idx="2">
-            <a:schemeClr val="accent1">
-              <a:shade val="50000"/>
-            </a:schemeClr>
-          </a:lnRef>
-          <a:fillRef idx="1">
-            <a:schemeClr val="accent1"/>
-          </a:fillRef>
-          <a:effectRef idx="0">
-            <a:schemeClr val="accent1"/>
-          </a:effectRef>
-          <a:fontRef idx="minor">
-            <a:schemeClr val="lt1"/>
-          </a:fontRef>
-        </p:style>
-        <p:txBody>
-          <a:bodyPr rtlCol="0" anchor="ctr"/>
-          <a:lstStyle/>
-          <a:p>
-            <a:pPr algn="ctr"/>
-            <a:r>
-              <a:rPr lang="en-US" dirty="0">
-                <a:solidFill>
-                  <a:schemeClr val="tx1"/>
-                </a:solidFill>
-              </a:rPr>
-              <a:t>RDMA Apps</a:t>
-            </a:r>
-          </a:p>
-          <a:p>
-            <a:pPr algn="ctr"/>
-            <a:r>
-              <a:rPr lang="en-US" dirty="0">
-                <a:solidFill>
-                  <a:schemeClr val="tx1"/>
-                </a:solidFill>
-              </a:rPr>
-              <a:t>Container </a:t>
-            </a:r>
-            <a:r>
-              <a:rPr lang="en-US" i="1" dirty="0">
-                <a:solidFill>
-                  <a:schemeClr val="tx1"/>
-                </a:solidFill>
-              </a:rPr>
-              <a:t>2</a:t>
-            </a:r>
-          </a:p>
-        </p:txBody>
-      </p:sp>
-      <p:sp>
-        <p:nvSpPr>
-          <p:cNvPr id="55" name="TextBox 54"/>
-          <p:cNvSpPr txBox="1"/>
-          <p:nvPr/>
-        </p:nvSpPr>
-        <p:spPr>
-          <a:xfrm>
-            <a:off x="3589869" y="2248634"/>
-            <a:ext cx="999068" cy="646331"/>
-          </a:xfrm>
-          <a:prstGeom prst="rect">
-            <a:avLst/>
-          </a:prstGeom>
-          <a:noFill/>
-        </p:spPr>
-        <p:txBody>
-          <a:bodyPr wrap="square" rtlCol="0">
-            <a:spAutoFit/>
-          </a:bodyPr>
-          <a:lstStyle/>
-          <a:p>
-            <a:pPr algn="ctr"/>
-            <a:r>
-              <a:rPr lang="en-US" dirty="0"/>
-              <a:t>Location Queries</a:t>
-            </a:r>
-          </a:p>
-        </p:txBody>
-      </p:sp>
-      <p:sp>
-        <p:nvSpPr>
-          <p:cNvPr id="62" name="Rectangle 61"/>
-          <p:cNvSpPr/>
-          <p:nvPr/>
-        </p:nvSpPr>
-        <p:spPr>
-          <a:xfrm>
-            <a:off x="5892799" y="1234813"/>
-            <a:ext cx="2099733" cy="640080"/>
-          </a:xfrm>
-          <a:prstGeom prst="rect">
-            <a:avLst/>
-          </a:prstGeom>
-          <a:noFill/>
-          <a:ln w="19050">
-            <a:solidFill>
-              <a:schemeClr val="tx1">
-                <a:lumMod val="75000"/>
-                <a:lumOff val="25000"/>
-              </a:schemeClr>
-            </a:solidFill>
-          </a:ln>
-        </p:spPr>
-        <p:style>
-          <a:lnRef idx="2">
-            <a:schemeClr val="accent1">
-              <a:shade val="50000"/>
-            </a:schemeClr>
-          </a:lnRef>
-          <a:fillRef idx="1">
-            <a:schemeClr val="accent1"/>
-          </a:fillRef>
-          <a:effectRef idx="0">
-            <a:schemeClr val="accent1"/>
-          </a:effectRef>
-          <a:fontRef idx="minor">
-            <a:schemeClr val="lt1"/>
-          </a:fontRef>
-        </p:style>
-        <p:txBody>
-          <a:bodyPr rtlCol="0" anchor="ctr"/>
-          <a:lstStyle/>
-          <a:p>
-            <a:pPr algn="ctr"/>
-            <a:r>
-              <a:rPr lang="en-US" dirty="0">
-                <a:solidFill>
-                  <a:schemeClr val="tx1"/>
-                </a:solidFill>
-              </a:rPr>
-              <a:t>Container </a:t>
-            </a:r>
-            <a:r>
-              <a:rPr lang="en-US" i="1" dirty="0">
-                <a:solidFill>
-                  <a:schemeClr val="tx1"/>
-                </a:solidFill>
-              </a:rPr>
-              <a:t>3</a:t>
-            </a:r>
-          </a:p>
-        </p:txBody>
-      </p:sp>
-      <p:sp>
-        <p:nvSpPr>
-          <p:cNvPr id="53" name="Rectangle 5"/>
-          <p:cNvSpPr/>
-          <p:nvPr/>
-        </p:nvSpPr>
-        <p:spPr>
-          <a:xfrm>
-            <a:off x="617761" y="2576597"/>
-            <a:ext cx="2859916" cy="437744"/>
-          </a:xfrm>
-          <a:prstGeom prst="rect">
-            <a:avLst/>
-          </a:prstGeom>
-          <a:solidFill>
-            <a:schemeClr val="tx2">
-              <a:lumMod val="20000"/>
-              <a:lumOff val="80000"/>
-            </a:schemeClr>
-          </a:solidFill>
-          <a:ln w="19050">
-            <a:solidFill>
-              <a:schemeClr val="tx1">
-                <a:lumMod val="75000"/>
-                <a:lumOff val="25000"/>
-              </a:schemeClr>
-            </a:solidFill>
-          </a:ln>
-        </p:spPr>
-        <p:style>
-          <a:lnRef idx="2">
-            <a:schemeClr val="accent1">
-              <a:shade val="50000"/>
-            </a:schemeClr>
-          </a:lnRef>
-          <a:fillRef idx="1">
-            <a:schemeClr val="accent1"/>
-          </a:fillRef>
-          <a:effectRef idx="0">
-            <a:schemeClr val="accent1"/>
-          </a:effectRef>
-          <a:fontRef idx="minor">
-            <a:schemeClr val="lt1"/>
-          </a:fontRef>
-        </p:style>
-        <p:txBody>
-          <a:bodyPr rtlCol="0" anchor="ctr"/>
-          <a:lstStyle/>
-          <a:p>
-            <a:pPr algn="ctr"/>
-            <a:r>
-              <a:rPr lang="en-US" dirty="0">
-                <a:solidFill>
-                  <a:sysClr val="windowText" lastClr="000000"/>
-                </a:solidFill>
-              </a:rPr>
-              <a:t>Verbs API</a:t>
-            </a:r>
-          </a:p>
-        </p:txBody>
-      </p:sp>
-      <p:sp>
-        <p:nvSpPr>
-          <p:cNvPr id="66" name="Rectangle 5"/>
-          <p:cNvSpPr/>
-          <p:nvPr/>
-        </p:nvSpPr>
-        <p:spPr>
-          <a:xfrm>
-            <a:off x="607347" y="2007238"/>
-            <a:ext cx="1342578" cy="437744"/>
-          </a:xfrm>
-          <a:prstGeom prst="rect">
-            <a:avLst/>
-          </a:prstGeom>
-          <a:solidFill>
-            <a:schemeClr val="tx2">
-              <a:lumMod val="20000"/>
-              <a:lumOff val="80000"/>
-            </a:schemeClr>
-          </a:solidFill>
-          <a:ln w="19050">
-            <a:solidFill>
-              <a:schemeClr val="tx1">
-                <a:lumMod val="75000"/>
-                <a:lumOff val="25000"/>
-              </a:schemeClr>
-            </a:solidFill>
-          </a:ln>
-        </p:spPr>
-        <p:style>
-          <a:lnRef idx="2">
-            <a:schemeClr val="accent1">
-              <a:shade val="50000"/>
-            </a:schemeClr>
-          </a:lnRef>
-          <a:fillRef idx="1">
-            <a:schemeClr val="accent1"/>
-          </a:fillRef>
-          <a:effectRef idx="0">
-            <a:schemeClr val="accent1"/>
-          </a:effectRef>
-          <a:fontRef idx="minor">
-            <a:schemeClr val="lt1"/>
-          </a:fontRef>
-        </p:style>
-        <p:txBody>
-          <a:bodyPr rtlCol="0" anchor="ctr"/>
-          <a:lstStyle/>
-          <a:p>
-            <a:pPr algn="ctr"/>
-            <a:r>
-              <a:rPr lang="en-US" dirty="0">
-                <a:solidFill>
-                  <a:sysClr val="windowText" lastClr="000000"/>
-                </a:solidFill>
-              </a:rPr>
-              <a:t>IP to Verbs </a:t>
-            </a:r>
-          </a:p>
-        </p:txBody>
-      </p:sp>
-      <p:cxnSp>
-        <p:nvCxnSpPr>
-          <p:cNvPr id="67" name="Straight Connector 26"/>
-          <p:cNvCxnSpPr/>
-          <p:nvPr/>
-        </p:nvCxnSpPr>
-        <p:spPr>
-          <a:xfrm>
-            <a:off x="1289046" y="1878454"/>
-            <a:ext cx="0" cy="137160"/>
-          </a:xfrm>
-          <a:prstGeom prst="line">
-            <a:avLst/>
-          </a:prstGeom>
-          <a:ln w="19050">
-            <a:solidFill>
-              <a:schemeClr val="tx1"/>
-            </a:solidFill>
-            <a:headEnd type="none"/>
-            <a:tailEnd type="arrow"/>
-          </a:ln>
-        </p:spPr>
-        <p:style>
-          <a:lnRef idx="1">
-            <a:schemeClr val="accent1"/>
-          </a:lnRef>
-          <a:fillRef idx="0">
-            <a:schemeClr val="accent1"/>
-          </a:fillRef>
-          <a:effectRef idx="0">
-            <a:schemeClr val="accent1"/>
-          </a:effectRef>
-          <a:fontRef idx="minor">
-            <a:schemeClr val="tx1"/>
-          </a:fontRef>
-        </p:style>
-      </p:cxnSp>
-      <p:cxnSp>
-        <p:nvCxnSpPr>
-          <p:cNvPr id="68" name="Straight Connector 26"/>
-          <p:cNvCxnSpPr/>
-          <p:nvPr/>
-        </p:nvCxnSpPr>
-        <p:spPr>
-          <a:xfrm>
-            <a:off x="2765325" y="1869218"/>
-            <a:ext cx="0" cy="685800"/>
-          </a:xfrm>
-          <a:prstGeom prst="line">
-            <a:avLst/>
-          </a:prstGeom>
-          <a:ln w="19050">
-            <a:solidFill>
-              <a:schemeClr val="tx1"/>
-            </a:solidFill>
-            <a:headEnd type="none"/>
-            <a:tailEnd type="arrow"/>
-          </a:ln>
-        </p:spPr>
-        <p:style>
-          <a:lnRef idx="1">
-            <a:schemeClr val="accent1"/>
-          </a:lnRef>
-          <a:fillRef idx="0">
-            <a:schemeClr val="accent1"/>
-          </a:fillRef>
-          <a:effectRef idx="0">
-            <a:schemeClr val="accent1"/>
-          </a:effectRef>
-          <a:fontRef idx="minor">
-            <a:schemeClr val="tx1"/>
-          </a:fontRef>
-        </p:style>
-      </p:cxnSp>
-      <p:sp>
-        <p:nvSpPr>
-          <p:cNvPr id="69" name="Rectangle 5"/>
-          <p:cNvSpPr/>
-          <p:nvPr/>
-        </p:nvSpPr>
-        <p:spPr>
-          <a:xfrm>
-            <a:off x="623918" y="3442677"/>
-            <a:ext cx="2859916" cy="437744"/>
-          </a:xfrm>
-          <a:prstGeom prst="rect">
-            <a:avLst/>
-          </a:prstGeom>
-          <a:solidFill>
-            <a:schemeClr val="tx2">
-              <a:lumMod val="20000"/>
-              <a:lumOff val="80000"/>
-            </a:schemeClr>
-          </a:solidFill>
-          <a:ln w="19050">
-            <a:solidFill>
-              <a:schemeClr val="tx1">
-                <a:lumMod val="75000"/>
-                <a:lumOff val="25000"/>
-              </a:schemeClr>
-            </a:solidFill>
-          </a:ln>
-        </p:spPr>
-        <p:style>
-          <a:lnRef idx="2">
-            <a:schemeClr val="accent1">
-              <a:shade val="50000"/>
-            </a:schemeClr>
-          </a:lnRef>
-          <a:fillRef idx="1">
-            <a:schemeClr val="accent1"/>
-          </a:fillRef>
-          <a:effectRef idx="0">
-            <a:schemeClr val="accent1"/>
-          </a:effectRef>
-          <a:fontRef idx="minor">
-            <a:schemeClr val="lt1"/>
-          </a:fontRef>
-        </p:style>
-        <p:txBody>
-          <a:bodyPr rtlCol="0" anchor="ctr"/>
-          <a:lstStyle/>
-          <a:p>
-            <a:pPr algn="ctr"/>
-            <a:r>
-              <a:rPr lang="en-US" dirty="0">
-                <a:solidFill>
-                  <a:sysClr val="windowText" lastClr="000000"/>
-                </a:solidFill>
-              </a:rPr>
-              <a:t>Container Locator</a:t>
-            </a:r>
-          </a:p>
-        </p:txBody>
-      </p:sp>
-      <p:cxnSp>
-        <p:nvCxnSpPr>
-          <p:cNvPr id="71" name="Straight Connector 26"/>
-          <p:cNvCxnSpPr/>
-          <p:nvPr/>
-        </p:nvCxnSpPr>
-        <p:spPr>
-          <a:xfrm>
-            <a:off x="2078755" y="3045571"/>
-            <a:ext cx="0" cy="365760"/>
-          </a:xfrm>
-          <a:prstGeom prst="line">
-            <a:avLst/>
-          </a:prstGeom>
-          <a:ln w="19050">
-            <a:solidFill>
-              <a:schemeClr val="tx1"/>
-            </a:solidFill>
-            <a:headEnd type="none"/>
-            <a:tailEnd type="arrow"/>
-          </a:ln>
-        </p:spPr>
-        <p:style>
-          <a:lnRef idx="1">
-            <a:schemeClr val="accent1"/>
-          </a:lnRef>
-          <a:fillRef idx="0">
-            <a:schemeClr val="accent1"/>
-          </a:fillRef>
-          <a:effectRef idx="0">
-            <a:schemeClr val="accent1"/>
-          </a:effectRef>
-          <a:fontRef idx="minor">
-            <a:schemeClr val="tx1"/>
-          </a:fontRef>
-        </p:style>
-      </p:cxnSp>
-      <p:cxnSp>
-        <p:nvCxnSpPr>
-          <p:cNvPr id="73" name="Straight Connector 26"/>
-          <p:cNvCxnSpPr/>
-          <p:nvPr/>
-        </p:nvCxnSpPr>
-        <p:spPr>
-          <a:xfrm>
-            <a:off x="1286225" y="2440073"/>
-            <a:ext cx="0" cy="137160"/>
-          </a:xfrm>
-          <a:prstGeom prst="line">
-            <a:avLst/>
-          </a:prstGeom>
-          <a:ln w="19050">
-            <a:solidFill>
-              <a:schemeClr val="tx1"/>
-            </a:solidFill>
-            <a:headEnd type="none"/>
-            <a:tailEnd type="arrow"/>
-          </a:ln>
-        </p:spPr>
-        <p:style>
-          <a:lnRef idx="1">
-            <a:schemeClr val="accent1"/>
-          </a:lnRef>
-          <a:fillRef idx="0">
-            <a:schemeClr val="accent1"/>
-          </a:fillRef>
-          <a:effectRef idx="0">
-            <a:schemeClr val="accent1"/>
-          </a:effectRef>
-          <a:fontRef idx="minor">
-            <a:schemeClr val="tx1"/>
-          </a:fontRef>
-        </p:style>
-      </p:cxnSp>
-      <p:sp>
-        <p:nvSpPr>
-          <p:cNvPr id="74" name="Rectangle 5"/>
-          <p:cNvSpPr/>
-          <p:nvPr/>
-        </p:nvSpPr>
-        <p:spPr>
-          <a:xfrm>
-            <a:off x="621096" y="4308757"/>
-            <a:ext cx="2859916" cy="437744"/>
-          </a:xfrm>
-          <a:prstGeom prst="rect">
-            <a:avLst/>
-          </a:prstGeom>
-          <a:solidFill>
-            <a:schemeClr val="tx2">
-              <a:lumMod val="20000"/>
-              <a:lumOff val="80000"/>
-            </a:schemeClr>
-          </a:solidFill>
-          <a:ln w="19050">
-            <a:solidFill>
-              <a:schemeClr val="tx1">
-                <a:lumMod val="75000"/>
-                <a:lumOff val="25000"/>
-              </a:schemeClr>
-            </a:solidFill>
-          </a:ln>
-        </p:spPr>
-        <p:style>
-          <a:lnRef idx="2">
-            <a:schemeClr val="accent1">
-              <a:shade val="50000"/>
-            </a:schemeClr>
-          </a:lnRef>
-          <a:fillRef idx="1">
-            <a:schemeClr val="accent1"/>
-          </a:fillRef>
-          <a:effectRef idx="0">
-            <a:schemeClr val="accent1"/>
-          </a:effectRef>
-          <a:fontRef idx="minor">
-            <a:schemeClr val="lt1"/>
-          </a:fontRef>
-        </p:style>
-        <p:txBody>
-          <a:bodyPr rtlCol="0" anchor="ctr"/>
-          <a:lstStyle/>
-          <a:p>
-            <a:pPr algn="ctr"/>
-            <a:r>
-              <a:rPr lang="en-US" dirty="0">
-                <a:solidFill>
-                  <a:sysClr val="windowText" lastClr="000000"/>
-                </a:solidFill>
-              </a:rPr>
-              <a:t>Virtualized NIC</a:t>
-            </a:r>
-          </a:p>
-        </p:txBody>
-      </p:sp>
-      <p:sp>
-        <p:nvSpPr>
-          <p:cNvPr id="76" name="Rectangle 5"/>
-          <p:cNvSpPr/>
-          <p:nvPr/>
-        </p:nvSpPr>
-        <p:spPr>
-          <a:xfrm>
-            <a:off x="4032828" y="2891011"/>
-            <a:ext cx="1342578" cy="457200"/>
-          </a:xfrm>
-          <a:prstGeom prst="rect">
-            <a:avLst/>
-          </a:prstGeom>
-          <a:solidFill>
-            <a:srgbClr val="FFFFFF"/>
-          </a:solidFill>
-          <a:ln w="19050">
-            <a:solidFill>
-              <a:schemeClr val="tx1">
-                <a:lumMod val="75000"/>
-                <a:lumOff val="25000"/>
-              </a:schemeClr>
-            </a:solidFill>
-          </a:ln>
-        </p:spPr>
-        <p:style>
-          <a:lnRef idx="2">
-            <a:schemeClr val="accent1">
-              <a:shade val="50000"/>
-            </a:schemeClr>
-          </a:lnRef>
-          <a:fillRef idx="1">
-            <a:schemeClr val="accent1"/>
-          </a:fillRef>
-          <a:effectRef idx="0">
-            <a:schemeClr val="accent1"/>
-          </a:effectRef>
-          <a:fontRef idx="minor">
-            <a:schemeClr val="lt1"/>
-          </a:fontRef>
-        </p:style>
-        <p:txBody>
-          <a:bodyPr rtlCol="0" anchor="ctr"/>
-          <a:lstStyle/>
-          <a:p>
-            <a:pPr algn="ctr"/>
-            <a:r>
-              <a:rPr lang="en-US" dirty="0" err="1">
-                <a:solidFill>
-                  <a:sysClr val="windowText" lastClr="000000"/>
-                </a:solidFill>
-              </a:rPr>
-              <a:t>Mesos</a:t>
-            </a:r>
-            <a:endParaRPr lang="en-US" dirty="0">
-              <a:solidFill>
-                <a:sysClr val="windowText" lastClr="000000"/>
-              </a:solidFill>
-            </a:endParaRPr>
-          </a:p>
-        </p:txBody>
-      </p:sp>
-      <p:sp>
-        <p:nvSpPr>
-          <p:cNvPr id="77" name="Rectangle 5"/>
-          <p:cNvSpPr/>
-          <p:nvPr/>
-        </p:nvSpPr>
-        <p:spPr>
-          <a:xfrm>
-            <a:off x="4044117" y="3430056"/>
-            <a:ext cx="1342578" cy="457200"/>
-          </a:xfrm>
-          <a:prstGeom prst="rect">
-            <a:avLst/>
-          </a:prstGeom>
-          <a:solidFill>
-            <a:srgbClr val="FFFFFF"/>
-          </a:solidFill>
-          <a:ln w="19050">
-            <a:solidFill>
-              <a:schemeClr val="tx1">
-                <a:lumMod val="75000"/>
-                <a:lumOff val="25000"/>
-              </a:schemeClr>
-            </a:solidFill>
-          </a:ln>
-        </p:spPr>
-        <p:style>
-          <a:lnRef idx="2">
-            <a:schemeClr val="accent1">
-              <a:shade val="50000"/>
-            </a:schemeClr>
-          </a:lnRef>
-          <a:fillRef idx="1">
-            <a:schemeClr val="accent1"/>
-          </a:fillRef>
-          <a:effectRef idx="0">
-            <a:schemeClr val="accent1"/>
-          </a:effectRef>
-          <a:fontRef idx="minor">
-            <a:schemeClr val="lt1"/>
-          </a:fontRef>
-        </p:style>
-        <p:txBody>
-          <a:bodyPr rtlCol="0" anchor="ctr"/>
-          <a:lstStyle/>
-          <a:p>
-            <a:pPr algn="ctr">
-              <a:lnSpc>
-                <a:spcPct val="80000"/>
-              </a:lnSpc>
-            </a:pPr>
-            <a:r>
-              <a:rPr lang="en-US" dirty="0">
-                <a:solidFill>
-                  <a:sysClr val="windowText" lastClr="000000"/>
-                </a:solidFill>
-              </a:rPr>
-              <a:t>Fabric Controller</a:t>
-            </a:r>
-          </a:p>
-        </p:txBody>
-      </p:sp>
-      <p:sp>
-        <p:nvSpPr>
-          <p:cNvPr id="80" name="Rectangle 5"/>
-          <p:cNvSpPr/>
-          <p:nvPr/>
-        </p:nvSpPr>
-        <p:spPr>
-          <a:xfrm>
-            <a:off x="618274" y="5174838"/>
-            <a:ext cx="2859916" cy="437744"/>
-          </a:xfrm>
-          <a:prstGeom prst="rect">
-            <a:avLst/>
-          </a:prstGeom>
-          <a:solidFill>
-            <a:schemeClr val="tx2">
-              <a:lumMod val="20000"/>
-              <a:lumOff val="80000"/>
-            </a:schemeClr>
-          </a:solidFill>
-          <a:ln w="19050">
-            <a:solidFill>
-              <a:schemeClr val="tx1">
-                <a:lumMod val="75000"/>
-                <a:lumOff val="25000"/>
-              </a:schemeClr>
-            </a:solidFill>
-          </a:ln>
-        </p:spPr>
-        <p:style>
-          <a:lnRef idx="2">
-            <a:schemeClr val="accent1">
-              <a:shade val="50000"/>
-            </a:schemeClr>
-          </a:lnRef>
-          <a:fillRef idx="1">
-            <a:schemeClr val="accent1"/>
-          </a:fillRef>
-          <a:effectRef idx="0">
-            <a:schemeClr val="accent1"/>
-          </a:effectRef>
-          <a:fontRef idx="minor">
-            <a:schemeClr val="lt1"/>
-          </a:fontRef>
-        </p:style>
-        <p:txBody>
-          <a:bodyPr rtlCol="0" anchor="ctr"/>
-          <a:lstStyle/>
-          <a:p>
-            <a:pPr algn="ctr"/>
-            <a:r>
-              <a:rPr lang="en-US" dirty="0">
-                <a:solidFill>
-                  <a:sysClr val="windowText" lastClr="000000"/>
-                </a:solidFill>
-              </a:rPr>
-              <a:t>NIC</a:t>
-            </a:r>
-          </a:p>
-        </p:txBody>
-      </p:sp>
-      <p:sp>
-        <p:nvSpPr>
-          <p:cNvPr id="82" name="Rectangle 5"/>
-          <p:cNvSpPr/>
-          <p:nvPr/>
-        </p:nvSpPr>
-        <p:spPr>
-          <a:xfrm>
-            <a:off x="5900961" y="2576598"/>
-            <a:ext cx="2103120" cy="437744"/>
-          </a:xfrm>
-          <a:prstGeom prst="rect">
-            <a:avLst/>
-          </a:prstGeom>
-          <a:solidFill>
-            <a:schemeClr val="tx2">
-              <a:lumMod val="20000"/>
-              <a:lumOff val="80000"/>
-            </a:schemeClr>
-          </a:solidFill>
-          <a:ln w="19050">
-            <a:solidFill>
-              <a:schemeClr val="tx1">
-                <a:lumMod val="75000"/>
-                <a:lumOff val="25000"/>
-              </a:schemeClr>
-            </a:solidFill>
-          </a:ln>
-        </p:spPr>
-        <p:style>
-          <a:lnRef idx="2">
-            <a:schemeClr val="accent1">
-              <a:shade val="50000"/>
-            </a:schemeClr>
-          </a:lnRef>
-          <a:fillRef idx="1">
-            <a:schemeClr val="accent1"/>
-          </a:fillRef>
-          <a:effectRef idx="0">
-            <a:schemeClr val="accent1"/>
-          </a:effectRef>
-          <a:fontRef idx="minor">
-            <a:schemeClr val="lt1"/>
-          </a:fontRef>
-        </p:style>
-        <p:txBody>
-          <a:bodyPr rtlCol="0" anchor="ctr"/>
-          <a:lstStyle/>
-          <a:p>
-            <a:pPr algn="ctr"/>
-            <a:r>
-              <a:rPr lang="en-US" dirty="0">
-                <a:solidFill>
-                  <a:sysClr val="windowText" lastClr="000000"/>
-                </a:solidFill>
-              </a:rPr>
-              <a:t>Verbs API</a:t>
-            </a:r>
-          </a:p>
-        </p:txBody>
-      </p:sp>
-      <p:sp>
-        <p:nvSpPr>
-          <p:cNvPr id="83" name="Rectangle 5"/>
-          <p:cNvSpPr/>
-          <p:nvPr/>
-        </p:nvSpPr>
-        <p:spPr>
-          <a:xfrm>
-            <a:off x="5907118" y="3442678"/>
-            <a:ext cx="2103120" cy="437744"/>
-          </a:xfrm>
-          <a:prstGeom prst="rect">
-            <a:avLst/>
-          </a:prstGeom>
-          <a:solidFill>
-            <a:schemeClr val="tx2">
-              <a:lumMod val="20000"/>
-              <a:lumOff val="80000"/>
-            </a:schemeClr>
-          </a:solidFill>
-          <a:ln w="19050">
-            <a:solidFill>
-              <a:schemeClr val="tx1">
-                <a:lumMod val="75000"/>
-                <a:lumOff val="25000"/>
-              </a:schemeClr>
-            </a:solidFill>
-          </a:ln>
-        </p:spPr>
-        <p:style>
-          <a:lnRef idx="2">
-            <a:schemeClr val="accent1">
-              <a:shade val="50000"/>
-            </a:schemeClr>
-          </a:lnRef>
-          <a:fillRef idx="1">
-            <a:schemeClr val="accent1"/>
-          </a:fillRef>
-          <a:effectRef idx="0">
-            <a:schemeClr val="accent1"/>
-          </a:effectRef>
-          <a:fontRef idx="minor">
-            <a:schemeClr val="lt1"/>
-          </a:fontRef>
-        </p:style>
-        <p:txBody>
-          <a:bodyPr rtlCol="0" anchor="ctr"/>
-          <a:lstStyle/>
-          <a:p>
-            <a:pPr algn="ctr"/>
-            <a:r>
-              <a:rPr lang="en-US" dirty="0">
-                <a:solidFill>
-                  <a:sysClr val="windowText" lastClr="000000"/>
-                </a:solidFill>
-              </a:rPr>
-              <a:t>Container Locator</a:t>
-            </a:r>
-          </a:p>
-        </p:txBody>
-      </p:sp>
-      <p:sp>
-        <p:nvSpPr>
-          <p:cNvPr id="85" name="Rectangle 5"/>
-          <p:cNvSpPr/>
-          <p:nvPr/>
-        </p:nvSpPr>
-        <p:spPr>
-          <a:xfrm>
-            <a:off x="5904296" y="4308758"/>
-            <a:ext cx="2103120" cy="437744"/>
-          </a:xfrm>
-          <a:prstGeom prst="rect">
-            <a:avLst/>
-          </a:prstGeom>
-          <a:solidFill>
-            <a:schemeClr val="tx2">
-              <a:lumMod val="20000"/>
-              <a:lumOff val="80000"/>
-            </a:schemeClr>
-          </a:solidFill>
-          <a:ln w="19050">
-            <a:solidFill>
-              <a:schemeClr val="tx1">
-                <a:lumMod val="75000"/>
-                <a:lumOff val="25000"/>
-              </a:schemeClr>
-            </a:solidFill>
-          </a:ln>
-        </p:spPr>
-        <p:style>
-          <a:lnRef idx="2">
-            <a:schemeClr val="accent1">
-              <a:shade val="50000"/>
-            </a:schemeClr>
-          </a:lnRef>
-          <a:fillRef idx="1">
-            <a:schemeClr val="accent1"/>
-          </a:fillRef>
-          <a:effectRef idx="0">
-            <a:schemeClr val="accent1"/>
-          </a:effectRef>
-          <a:fontRef idx="minor">
-            <a:schemeClr val="lt1"/>
-          </a:fontRef>
-        </p:style>
-        <p:txBody>
-          <a:bodyPr rtlCol="0" anchor="ctr"/>
-          <a:lstStyle/>
-          <a:p>
-            <a:pPr algn="ctr"/>
-            <a:r>
-              <a:rPr lang="en-US" dirty="0">
-                <a:solidFill>
-                  <a:sysClr val="windowText" lastClr="000000"/>
-                </a:solidFill>
-              </a:rPr>
-              <a:t>Virtualized NIC</a:t>
-            </a:r>
-          </a:p>
-        </p:txBody>
-      </p:sp>
-      <p:sp>
-        <p:nvSpPr>
-          <p:cNvPr id="86" name="Rectangle 5"/>
-          <p:cNvSpPr/>
-          <p:nvPr/>
-        </p:nvSpPr>
-        <p:spPr>
-          <a:xfrm>
-            <a:off x="5901474" y="5174839"/>
-            <a:ext cx="2103120" cy="437744"/>
-          </a:xfrm>
-          <a:prstGeom prst="rect">
-            <a:avLst/>
-          </a:prstGeom>
-          <a:solidFill>
-            <a:schemeClr val="tx2">
-              <a:lumMod val="20000"/>
-              <a:lumOff val="80000"/>
-            </a:schemeClr>
-          </a:solidFill>
-          <a:ln w="19050">
-            <a:solidFill>
-              <a:schemeClr val="tx1">
-                <a:lumMod val="75000"/>
-                <a:lumOff val="25000"/>
-              </a:schemeClr>
-            </a:solidFill>
-          </a:ln>
-        </p:spPr>
-        <p:style>
-          <a:lnRef idx="2">
-            <a:schemeClr val="accent1">
-              <a:shade val="50000"/>
-            </a:schemeClr>
-          </a:lnRef>
-          <a:fillRef idx="1">
-            <a:schemeClr val="accent1"/>
-          </a:fillRef>
-          <a:effectRef idx="0">
-            <a:schemeClr val="accent1"/>
-          </a:effectRef>
-          <a:fontRef idx="minor">
-            <a:schemeClr val="lt1"/>
-          </a:fontRef>
-        </p:style>
-        <p:txBody>
-          <a:bodyPr rtlCol="0" anchor="ctr"/>
-          <a:lstStyle/>
-          <a:p>
-            <a:pPr algn="ctr"/>
-            <a:r>
-              <a:rPr lang="en-US" dirty="0">
-                <a:solidFill>
-                  <a:sysClr val="windowText" lastClr="000000"/>
-                </a:solidFill>
-              </a:rPr>
-              <a:t>NIC</a:t>
-            </a:r>
-          </a:p>
-        </p:txBody>
-      </p:sp>
-      <p:sp>
-        <p:nvSpPr>
-          <p:cNvPr id="87" name="TextBox 54"/>
-          <p:cNvSpPr txBox="1"/>
-          <p:nvPr/>
-        </p:nvSpPr>
-        <p:spPr>
-          <a:xfrm>
-            <a:off x="3843864" y="4111301"/>
-            <a:ext cx="2262629" cy="369332"/>
-          </a:xfrm>
-          <a:prstGeom prst="rect">
-            <a:avLst/>
-          </a:prstGeom>
-          <a:noFill/>
-        </p:spPr>
-        <p:txBody>
-          <a:bodyPr wrap="square" rtlCol="0">
-            <a:spAutoFit/>
-          </a:bodyPr>
-          <a:lstStyle/>
-          <a:p>
-            <a:r>
-              <a:rPr lang="en-US" dirty="0"/>
-              <a:t>Shared Memory</a:t>
-            </a:r>
-          </a:p>
-        </p:txBody>
-      </p:sp>
-      <p:cxnSp>
-        <p:nvCxnSpPr>
-          <p:cNvPr id="89" name="Straight Connector 26"/>
-          <p:cNvCxnSpPr>
-            <a:stCxn id="69" idx="3"/>
-            <a:endCxn id="77" idx="1"/>
-          </p:cNvCxnSpPr>
-          <p:nvPr/>
-        </p:nvCxnSpPr>
-        <p:spPr>
-          <a:xfrm flipV="1">
-            <a:off x="3483834" y="3658656"/>
-            <a:ext cx="560283" cy="2893"/>
-          </a:xfrm>
-          <a:prstGeom prst="line">
-            <a:avLst/>
-          </a:prstGeom>
-          <a:ln w="28575" cmpd="sng">
-            <a:solidFill>
-              <a:schemeClr val="tx1"/>
-            </a:solidFill>
-            <a:prstDash val="dash"/>
-            <a:headEnd type="none"/>
-            <a:tailEnd type="arrow"/>
-          </a:ln>
-        </p:spPr>
-        <p:style>
-          <a:lnRef idx="1">
-            <a:schemeClr val="accent1"/>
-          </a:lnRef>
-          <a:fillRef idx="0">
-            <a:schemeClr val="accent1"/>
-          </a:fillRef>
-          <a:effectRef idx="0">
-            <a:schemeClr val="accent1"/>
-          </a:effectRef>
-          <a:fontRef idx="minor">
-            <a:schemeClr val="tx1"/>
-          </a:fontRef>
-        </p:style>
-      </p:cxnSp>
-      <p:cxnSp>
-        <p:nvCxnSpPr>
-          <p:cNvPr id="90" name="Straight Connector 26"/>
-          <p:cNvCxnSpPr/>
-          <p:nvPr/>
-        </p:nvCxnSpPr>
-        <p:spPr>
-          <a:xfrm>
-            <a:off x="3501155" y="4518771"/>
-            <a:ext cx="2403141" cy="8859"/>
-          </a:xfrm>
-          <a:prstGeom prst="line">
-            <a:avLst/>
-          </a:prstGeom>
-          <a:ln w="19050">
-            <a:solidFill>
-              <a:schemeClr val="tx1"/>
-            </a:solidFill>
-            <a:headEnd type="none"/>
-            <a:tailEnd type="arrow"/>
-          </a:ln>
-        </p:spPr>
-        <p:style>
-          <a:lnRef idx="1">
-            <a:schemeClr val="accent1"/>
-          </a:lnRef>
-          <a:fillRef idx="0">
-            <a:schemeClr val="accent1"/>
-          </a:fillRef>
-          <a:effectRef idx="0">
-            <a:schemeClr val="accent1"/>
-          </a:effectRef>
-          <a:fontRef idx="minor">
-            <a:schemeClr val="tx1"/>
-          </a:fontRef>
-        </p:style>
-      </p:cxnSp>
-      <p:cxnSp>
-        <p:nvCxnSpPr>
-          <p:cNvPr id="91" name="Straight Connector 26"/>
-          <p:cNvCxnSpPr/>
-          <p:nvPr/>
-        </p:nvCxnSpPr>
-        <p:spPr>
-          <a:xfrm>
-            <a:off x="2061821" y="3892237"/>
-            <a:ext cx="0" cy="365760"/>
-          </a:xfrm>
-          <a:prstGeom prst="line">
-            <a:avLst/>
-          </a:prstGeom>
-          <a:ln w="19050">
-            <a:solidFill>
-              <a:schemeClr val="tx1"/>
-            </a:solidFill>
-            <a:headEnd type="none"/>
-            <a:tailEnd type="arrow"/>
-          </a:ln>
-        </p:spPr>
-        <p:style>
-          <a:lnRef idx="1">
-            <a:schemeClr val="accent1"/>
-          </a:lnRef>
-          <a:fillRef idx="0">
-            <a:schemeClr val="accent1"/>
-          </a:fillRef>
-          <a:effectRef idx="0">
-            <a:schemeClr val="accent1"/>
-          </a:effectRef>
-          <a:fontRef idx="minor">
-            <a:schemeClr val="tx1"/>
-          </a:fontRef>
-        </p:style>
-      </p:cxnSp>
-      <p:cxnSp>
-        <p:nvCxnSpPr>
-          <p:cNvPr id="92" name="Straight Connector 26"/>
-          <p:cNvCxnSpPr/>
-          <p:nvPr/>
-        </p:nvCxnSpPr>
-        <p:spPr>
-          <a:xfrm>
-            <a:off x="2061822" y="4772771"/>
-            <a:ext cx="0" cy="365760"/>
-          </a:xfrm>
-          <a:prstGeom prst="line">
-            <a:avLst/>
-          </a:prstGeom>
-          <a:ln w="19050">
-            <a:solidFill>
-              <a:schemeClr val="tx1"/>
-            </a:solidFill>
-            <a:headEnd type="none"/>
-            <a:tailEnd type="arrow"/>
-          </a:ln>
-        </p:spPr>
-        <p:style>
-          <a:lnRef idx="1">
-            <a:schemeClr val="accent1"/>
-          </a:lnRef>
-          <a:fillRef idx="0">
-            <a:schemeClr val="accent1"/>
-          </a:fillRef>
-          <a:effectRef idx="0">
-            <a:schemeClr val="accent1"/>
-          </a:effectRef>
-          <a:fontRef idx="minor">
-            <a:schemeClr val="tx1"/>
-          </a:fontRef>
-        </p:style>
-      </p:cxnSp>
-      <p:cxnSp>
-        <p:nvCxnSpPr>
-          <p:cNvPr id="93" name="Straight Connector 26"/>
-          <p:cNvCxnSpPr/>
-          <p:nvPr/>
-        </p:nvCxnSpPr>
-        <p:spPr>
-          <a:xfrm>
-            <a:off x="6938622" y="3062504"/>
-            <a:ext cx="0" cy="365760"/>
-          </a:xfrm>
-          <a:prstGeom prst="line">
-            <a:avLst/>
-          </a:prstGeom>
-          <a:ln w="19050">
-            <a:solidFill>
-              <a:schemeClr val="tx1"/>
-            </a:solidFill>
-            <a:headEnd type="arrow"/>
-            <a:tailEnd type="none"/>
-          </a:ln>
-        </p:spPr>
-        <p:style>
-          <a:lnRef idx="1">
-            <a:schemeClr val="accent1"/>
-          </a:lnRef>
-          <a:fillRef idx="0">
-            <a:schemeClr val="accent1"/>
-          </a:fillRef>
-          <a:effectRef idx="0">
-            <a:schemeClr val="accent1"/>
-          </a:effectRef>
-          <a:fontRef idx="minor">
-            <a:schemeClr val="tx1"/>
-          </a:fontRef>
-        </p:style>
-      </p:cxnSp>
-      <p:cxnSp>
-        <p:nvCxnSpPr>
-          <p:cNvPr id="94" name="Straight Connector 26"/>
-          <p:cNvCxnSpPr/>
-          <p:nvPr/>
-        </p:nvCxnSpPr>
-        <p:spPr>
-          <a:xfrm>
-            <a:off x="6921688" y="3909170"/>
-            <a:ext cx="0" cy="365760"/>
-          </a:xfrm>
-          <a:prstGeom prst="line">
-            <a:avLst/>
-          </a:prstGeom>
-          <a:ln w="19050">
-            <a:solidFill>
-              <a:schemeClr val="tx1"/>
-            </a:solidFill>
-            <a:headEnd type="arrow"/>
-            <a:tailEnd type="none"/>
-          </a:ln>
-        </p:spPr>
-        <p:style>
-          <a:lnRef idx="1">
-            <a:schemeClr val="accent1"/>
-          </a:lnRef>
-          <a:fillRef idx="0">
-            <a:schemeClr val="accent1"/>
-          </a:fillRef>
-          <a:effectRef idx="0">
-            <a:schemeClr val="accent1"/>
-          </a:effectRef>
-          <a:fontRef idx="minor">
-            <a:schemeClr val="tx1"/>
-          </a:fontRef>
-        </p:style>
-      </p:cxnSp>
-      <p:cxnSp>
-        <p:nvCxnSpPr>
-          <p:cNvPr id="95" name="Straight Connector 26"/>
-          <p:cNvCxnSpPr/>
-          <p:nvPr/>
-        </p:nvCxnSpPr>
-        <p:spPr>
-          <a:xfrm>
-            <a:off x="6921689" y="4789704"/>
-            <a:ext cx="0" cy="365760"/>
-          </a:xfrm>
-          <a:prstGeom prst="line">
-            <a:avLst/>
-          </a:prstGeom>
-          <a:ln w="19050">
-            <a:solidFill>
-              <a:schemeClr val="tx1"/>
-            </a:solidFill>
-            <a:headEnd type="arrow"/>
-            <a:tailEnd type="none"/>
-          </a:ln>
-        </p:spPr>
-        <p:style>
-          <a:lnRef idx="1">
-            <a:schemeClr val="accent1"/>
-          </a:lnRef>
-          <a:fillRef idx="0">
-            <a:schemeClr val="accent1"/>
-          </a:fillRef>
-          <a:effectRef idx="0">
-            <a:schemeClr val="accent1"/>
-          </a:effectRef>
-          <a:fontRef idx="minor">
-            <a:schemeClr val="tx1"/>
-          </a:fontRef>
-        </p:style>
-      </p:cxnSp>
-      <p:cxnSp>
-        <p:nvCxnSpPr>
-          <p:cNvPr id="96" name="Straight Connector 26"/>
-          <p:cNvCxnSpPr/>
-          <p:nvPr/>
-        </p:nvCxnSpPr>
-        <p:spPr>
-          <a:xfrm>
-            <a:off x="3484222" y="5348505"/>
-            <a:ext cx="2403141" cy="8859"/>
-          </a:xfrm>
-          <a:prstGeom prst="line">
-            <a:avLst/>
-          </a:prstGeom>
-          <a:ln w="19050">
-            <a:solidFill>
-              <a:schemeClr val="tx1"/>
-            </a:solidFill>
-            <a:headEnd type="none"/>
-            <a:tailEnd type="arrow"/>
-          </a:ln>
-        </p:spPr>
-        <p:style>
-          <a:lnRef idx="1">
-            <a:schemeClr val="accent1"/>
-          </a:lnRef>
-          <a:fillRef idx="0">
-            <a:schemeClr val="accent1"/>
-          </a:fillRef>
-          <a:effectRef idx="0">
-            <a:schemeClr val="accent1"/>
-          </a:effectRef>
-          <a:fontRef idx="minor">
-            <a:schemeClr val="tx1"/>
-          </a:fontRef>
-        </p:style>
-      </p:cxnSp>
-      <p:cxnSp>
-        <p:nvCxnSpPr>
-          <p:cNvPr id="97" name="Straight Connector 26"/>
-          <p:cNvCxnSpPr/>
-          <p:nvPr/>
-        </p:nvCxnSpPr>
-        <p:spPr>
-          <a:xfrm>
-            <a:off x="6947858" y="1886151"/>
-            <a:ext cx="0" cy="685800"/>
-          </a:xfrm>
-          <a:prstGeom prst="line">
-            <a:avLst/>
-          </a:prstGeom>
-          <a:ln w="19050">
-            <a:solidFill>
-              <a:schemeClr val="tx1"/>
-            </a:solidFill>
-            <a:headEnd type="arrow"/>
-            <a:tailEnd type="none"/>
-          </a:ln>
-        </p:spPr>
-        <p:style>
-          <a:lnRef idx="1">
-            <a:schemeClr val="accent1"/>
-          </a:lnRef>
-          <a:fillRef idx="0">
-            <a:schemeClr val="accent1"/>
-          </a:fillRef>
-          <a:effectRef idx="0">
-            <a:schemeClr val="accent1"/>
-          </a:effectRef>
-          <a:fontRef idx="minor">
-            <a:schemeClr val="tx1"/>
-          </a:fontRef>
-        </p:style>
-      </p:cxnSp>
-      <p:cxnSp>
-        <p:nvCxnSpPr>
-          <p:cNvPr id="98" name="Straight Connector 26"/>
-          <p:cNvCxnSpPr>
-            <a:stCxn id="69" idx="3"/>
-            <a:endCxn id="76" idx="1"/>
-          </p:cNvCxnSpPr>
-          <p:nvPr/>
-        </p:nvCxnSpPr>
-        <p:spPr>
-          <a:xfrm flipV="1">
-            <a:off x="3483834" y="3119611"/>
-            <a:ext cx="548994" cy="541938"/>
-          </a:xfrm>
-          <a:prstGeom prst="bentConnector3">
-            <a:avLst>
-              <a:gd name="adj1" fmla="val 50000"/>
-            </a:avLst>
-          </a:prstGeom>
-          <a:ln w="28575" cmpd="sng">
-            <a:solidFill>
-              <a:schemeClr val="tx1"/>
-            </a:solidFill>
-            <a:prstDash val="dash"/>
-            <a:headEnd type="none"/>
-            <a:tailEnd type="arrow"/>
-          </a:ln>
-        </p:spPr>
-        <p:style>
-          <a:lnRef idx="1">
-            <a:schemeClr val="accent1"/>
-          </a:lnRef>
-          <a:fillRef idx="0">
-            <a:schemeClr val="accent1"/>
-          </a:fillRef>
-          <a:effectRef idx="0">
-            <a:schemeClr val="accent1"/>
-          </a:effectRef>
-          <a:fontRef idx="minor">
-            <a:schemeClr val="tx1"/>
-          </a:fontRef>
-        </p:style>
-      </p:cxnSp>
-      <p:cxnSp>
-        <p:nvCxnSpPr>
-          <p:cNvPr id="32" name="Straight Connector 26"/>
-          <p:cNvCxnSpPr/>
-          <p:nvPr/>
-        </p:nvCxnSpPr>
-        <p:spPr>
-          <a:xfrm>
-            <a:off x="3484225" y="5483972"/>
-            <a:ext cx="2403141" cy="8859"/>
-          </a:xfrm>
-          <a:prstGeom prst="line">
-            <a:avLst/>
-          </a:prstGeom>
-          <a:ln w="19050">
-            <a:solidFill>
-              <a:schemeClr val="tx1"/>
-            </a:solidFill>
-            <a:headEnd type="none"/>
-            <a:tailEnd type="arrow"/>
-          </a:ln>
-        </p:spPr>
-        <p:style>
-          <a:lnRef idx="1">
-            <a:schemeClr val="accent1"/>
-          </a:lnRef>
-          <a:fillRef idx="0">
-            <a:schemeClr val="accent1"/>
-          </a:fillRef>
-          <a:effectRef idx="0">
-            <a:schemeClr val="accent1"/>
-          </a:effectRef>
-          <a:fontRef idx="minor">
-            <a:schemeClr val="tx1"/>
-          </a:fontRef>
-        </p:style>
-      </p:cxnSp>
-      <p:sp>
-        <p:nvSpPr>
-          <p:cNvPr id="33" name="TextBox 54"/>
-          <p:cNvSpPr txBox="1"/>
-          <p:nvPr/>
-        </p:nvSpPr>
-        <p:spPr>
-          <a:xfrm>
-            <a:off x="4267192" y="4890234"/>
-            <a:ext cx="897467" cy="369332"/>
-          </a:xfrm>
-          <a:prstGeom prst="rect">
-            <a:avLst/>
-          </a:prstGeom>
-          <a:noFill/>
-        </p:spPr>
-        <p:txBody>
-          <a:bodyPr wrap="square" rtlCol="0">
-            <a:spAutoFit/>
-          </a:bodyPr>
-          <a:lstStyle/>
-          <a:p>
-            <a:r>
-              <a:rPr lang="en-US" dirty="0"/>
-              <a:t>DPDK</a:t>
-            </a:r>
-          </a:p>
-        </p:txBody>
-      </p:sp>
-      <p:sp>
-        <p:nvSpPr>
-          <p:cNvPr id="34" name="TextBox 54"/>
-          <p:cNvSpPr txBox="1"/>
-          <p:nvPr/>
-        </p:nvSpPr>
-        <p:spPr>
-          <a:xfrm>
-            <a:off x="4216393" y="5550634"/>
-            <a:ext cx="897467" cy="369332"/>
-          </a:xfrm>
-          <a:prstGeom prst="rect">
-            <a:avLst/>
-          </a:prstGeom>
-          <a:noFill/>
-        </p:spPr>
-        <p:txBody>
-          <a:bodyPr wrap="square" rtlCol="0">
-            <a:spAutoFit/>
-          </a:bodyPr>
-          <a:lstStyle/>
-          <a:p>
-            <a:r>
-              <a:rPr lang="en-US" dirty="0"/>
-              <a:t>RDMA</a:t>
-            </a:r>
-          </a:p>
-        </p:txBody>
-      </p:sp>
-    </p:spTree>
-    <p:extLst>
-      <p:ext uri="{BB962C8B-B14F-4D97-AF65-F5344CB8AC3E}">
-        <p14:creationId xmlns:p14="http://schemas.microsoft.com/office/powerpoint/2010/main" val="1164031415"/>
       </p:ext>
     </p:extLst>
   </p:cSld>

</xml_diff>